<commit_message>
Update progress report presentations.
</commit_message>
<xml_diff>
--- a/progress_reports/RSMG 6.pptx
+++ b/progress_reports/RSMG 6.pptx
@@ -14,20 +14,20 @@
     <p:sldId id="258" r:id="rId5"/>
     <p:sldId id="273" r:id="rId6"/>
     <p:sldId id="259" r:id="rId7"/>
-    <p:sldId id="280" r:id="rId8"/>
-    <p:sldId id="277" r:id="rId9"/>
-    <p:sldId id="261" r:id="rId10"/>
-    <p:sldId id="262" r:id="rId11"/>
-    <p:sldId id="276" r:id="rId12"/>
-    <p:sldId id="264" r:id="rId13"/>
-    <p:sldId id="267" r:id="rId14"/>
-    <p:sldId id="278" r:id="rId15"/>
-    <p:sldId id="282" r:id="rId16"/>
-    <p:sldId id="283" r:id="rId17"/>
-    <p:sldId id="284" r:id="rId18"/>
-    <p:sldId id="263" r:id="rId19"/>
-    <p:sldId id="260" r:id="rId20"/>
-    <p:sldId id="272" r:id="rId21"/>
+    <p:sldId id="260" r:id="rId8"/>
+    <p:sldId id="280" r:id="rId9"/>
+    <p:sldId id="277" r:id="rId10"/>
+    <p:sldId id="261" r:id="rId11"/>
+    <p:sldId id="262" r:id="rId12"/>
+    <p:sldId id="272" r:id="rId13"/>
+    <p:sldId id="263" r:id="rId14"/>
+    <p:sldId id="276" r:id="rId15"/>
+    <p:sldId id="264" r:id="rId16"/>
+    <p:sldId id="278" r:id="rId17"/>
+    <p:sldId id="282" r:id="rId18"/>
+    <p:sldId id="283" r:id="rId19"/>
+    <p:sldId id="284" r:id="rId20"/>
+    <p:sldId id="267" r:id="rId21"/>
     <p:sldId id="270" r:id="rId22"/>
   </p:sldIdLst>
   <p:sldSz cx="12192000" cy="6858000"/>
@@ -1017,7 +1017,7 @@
           <a:p>
             <a:fld id="{C34E6687-C7DD-4948-918C-F93BE208C6DA}" type="datetimeFigureOut">
               <a:rPr lang="en-GB" smtClean="0"/>
-              <a:t>06/06/2021</a:t>
+              <a:t>19/11/2022</a:t>
             </a:fld>
             <a:endParaRPr lang="en-GB"/>
           </a:p>
@@ -1715,156 +1715,7 @@
           <a:bodyPr/>
           <a:lstStyle/>
           <a:p>
-            <a:pPr marL="0" marR="0" lvl="0" indent="0" algn="l" defTabSz="914400" rtl="0" eaLnBrk="1" fontAlgn="auto" latinLnBrk="0" hangingPunct="1">
-              <a:lnSpc>
-                <a:spcPct val="100000"/>
-              </a:lnSpc>
-              <a:spcBef>
-                <a:spcPts val="0"/>
-              </a:spcBef>
-              <a:spcAft>
-                <a:spcPts val="0"/>
-              </a:spcAft>
-              <a:buClrTx/>
-              <a:buSzTx/>
-              <a:buFontTx/>
-              <a:buNone/>
-              <a:tabLst/>
-              <a:defRPr/>
-            </a:pPr>
-            <a:r>
-              <a:rPr lang="en-GB" sz="1200" dirty="0"/>
-              <a:t>So far, it seems the proposed approach is effective, but haven’t had a chance to compare much to other approaches.</a:t>
-            </a:r>
-          </a:p>
-          <a:p>
-            <a:pPr marL="0" marR="0" lvl="0" indent="0" algn="l" defTabSz="914400" rtl="0" eaLnBrk="1" fontAlgn="auto" latinLnBrk="0" hangingPunct="1">
-              <a:lnSpc>
-                <a:spcPct val="100000"/>
-              </a:lnSpc>
-              <a:spcBef>
-                <a:spcPts val="0"/>
-              </a:spcBef>
-              <a:spcAft>
-                <a:spcPts val="0"/>
-              </a:spcAft>
-              <a:buClrTx/>
-              <a:buSzTx/>
-              <a:buFontTx/>
-              <a:buNone/>
-              <a:tabLst/>
-              <a:defRPr/>
-            </a:pPr>
-            <a:endParaRPr lang="en-GB" sz="1200" dirty="0"/>
-          </a:p>
-          <a:p>
-            <a:pPr marL="0" marR="0" lvl="0" indent="0" algn="l" defTabSz="914400" rtl="0" eaLnBrk="1" fontAlgn="auto" latinLnBrk="0" hangingPunct="1">
-              <a:lnSpc>
-                <a:spcPct val="100000"/>
-              </a:lnSpc>
-              <a:spcBef>
-                <a:spcPts val="0"/>
-              </a:spcBef>
-              <a:spcAft>
-                <a:spcPts val="0"/>
-              </a:spcAft>
-              <a:buClrTx/>
-              <a:buSzTx/>
-              <a:buFontTx/>
-              <a:buNone/>
-              <a:tabLst/>
-              <a:defRPr/>
-            </a:pPr>
-            <a:r>
-              <a:rPr lang="en-GB" sz="1200" dirty="0"/>
-              <a:t>It would be very hard to find a heuristic for this problem since it involves combined logistics and manipulation.</a:t>
-            </a:r>
-          </a:p>
-          <a:p>
-            <a:pPr marL="0" marR="0" lvl="0" indent="0" algn="l" defTabSz="914400" rtl="0" eaLnBrk="1" fontAlgn="auto" latinLnBrk="0" hangingPunct="1">
-              <a:lnSpc>
-                <a:spcPct val="100000"/>
-              </a:lnSpc>
-              <a:spcBef>
-                <a:spcPts val="0"/>
-              </a:spcBef>
-              <a:spcAft>
-                <a:spcPts val="0"/>
-              </a:spcAft>
-              <a:buClrTx/>
-              <a:buSzTx/>
-              <a:buFontTx/>
-              <a:buNone/>
-              <a:tabLst/>
-              <a:defRPr/>
-            </a:pPr>
-            <a:endParaRPr lang="en-GB" sz="1200" dirty="0"/>
-          </a:p>
-          <a:p>
-            <a:pPr marL="0" marR="0" lvl="0" indent="0" algn="l" defTabSz="914400" rtl="0" eaLnBrk="1" fontAlgn="auto" latinLnBrk="0" hangingPunct="1">
-              <a:lnSpc>
-                <a:spcPct val="100000"/>
-              </a:lnSpc>
-              <a:spcBef>
-                <a:spcPts val="0"/>
-              </a:spcBef>
-              <a:spcAft>
-                <a:spcPts val="0"/>
-              </a:spcAft>
-              <a:buClrTx/>
-              <a:buSzTx/>
-              <a:buFontTx/>
-              <a:buNone/>
-              <a:tabLst/>
-              <a:defRPr/>
-            </a:pPr>
-            <a:r>
-              <a:rPr lang="en-GB" sz="1200" dirty="0"/>
-              <a:t>Not sure how well this will generalise or whether these trends will continue.</a:t>
-            </a:r>
-          </a:p>
-          <a:p>
-            <a:pPr marL="0" marR="0" lvl="0" indent="0" algn="l" defTabSz="914400" rtl="0" eaLnBrk="1" fontAlgn="auto" latinLnBrk="0" hangingPunct="1">
-              <a:lnSpc>
-                <a:spcPct val="100000"/>
-              </a:lnSpc>
-              <a:spcBef>
-                <a:spcPts val="0"/>
-              </a:spcBef>
-              <a:spcAft>
-                <a:spcPts val="0"/>
-              </a:spcAft>
-              <a:buClrTx/>
-              <a:buSzTx/>
-              <a:buFontTx/>
-              <a:buNone/>
-              <a:tabLst/>
-              <a:defRPr/>
-            </a:pPr>
-            <a:endParaRPr lang="en-GB" sz="1200" dirty="0"/>
-          </a:p>
-          <a:p>
-            <a:pPr marL="0" marR="0" lvl="0" indent="0" algn="l" defTabSz="914400" rtl="0" eaLnBrk="1" fontAlgn="auto" latinLnBrk="0" hangingPunct="1">
-              <a:lnSpc>
-                <a:spcPct val="100000"/>
-              </a:lnSpc>
-              <a:spcBef>
-                <a:spcPts val="0"/>
-              </a:spcBef>
-              <a:spcAft>
-                <a:spcPts val="0"/>
-              </a:spcAft>
-              <a:buClrTx/>
-              <a:buSzTx/>
-              <a:buFontTx/>
-              <a:buNone/>
-              <a:tabLst/>
-              <a:defRPr/>
-            </a:pPr>
-            <a:r>
-              <a:rPr lang="en-GB" sz="1200" dirty="0"/>
-              <a:t>I have found that for more complex problems, e.g. with twice as many blocks, that most abstract plan took 5-6 minutes to find, whereas the ground level took only 30-40 seconds.</a:t>
-            </a:r>
+            <a:endParaRPr lang="en-GB" dirty="0"/>
           </a:p>
         </p:txBody>
       </p:sp>
@@ -1885,7 +1736,7 @@
           <a:p>
             <a:fld id="{A04EEA3C-4D83-4EF4-A780-BEEAF6CB8D41}" type="slidenum">
               <a:rPr lang="en-GB" smtClean="0"/>
-              <a:t>11</a:t>
+              <a:t>12</a:t>
             </a:fld>
             <a:endParaRPr lang="en-GB"/>
           </a:p>
@@ -1894,7 +1745,7 @@
     </p:spTree>
     <p:extLst>
       <p:ext uri="{BB962C8B-B14F-4D97-AF65-F5344CB8AC3E}">
-        <p14:creationId xmlns:p14="http://schemas.microsoft.com/office/powerpoint/2010/main" val="3591377660"/>
+        <p14:creationId xmlns:p14="http://schemas.microsoft.com/office/powerpoint/2010/main" val="1455877763"/>
       </p:ext>
     </p:extLst>
   </p:cSld>
@@ -1948,88 +1799,9 @@
           <a:bodyPr/>
           <a:lstStyle/>
           <a:p>
-            <a:pPr marL="0" marR="0" lvl="0" indent="0" algn="l" defTabSz="914400" rtl="0" eaLnBrk="1" fontAlgn="auto" latinLnBrk="0" hangingPunct="1">
-              <a:lnSpc>
-                <a:spcPct val="100000"/>
-              </a:lnSpc>
-              <a:spcBef>
-                <a:spcPts val="0"/>
-              </a:spcBef>
-              <a:spcAft>
-                <a:spcPts val="0"/>
-              </a:spcAft>
-              <a:buClrTx/>
-              <a:buSzTx/>
-              <a:buFontTx/>
-              <a:buNone/>
-              <a:tabLst/>
-              <a:defRPr/>
-            </a:pPr>
-            <a:r>
-              <a:rPr lang="en-GB" dirty="0"/>
-              <a:t>Plans are rarely optimal in the classical sense.</a:t>
-            </a:r>
-          </a:p>
-          <a:p>
-            <a:pPr marL="0" marR="0" lvl="0" indent="0" algn="l" defTabSz="914400" rtl="0" eaLnBrk="1" fontAlgn="auto" latinLnBrk="0" hangingPunct="1">
-              <a:lnSpc>
-                <a:spcPct val="100000"/>
-              </a:lnSpc>
-              <a:spcBef>
-                <a:spcPts val="0"/>
-              </a:spcBef>
-              <a:spcAft>
-                <a:spcPts val="0"/>
-              </a:spcAft>
-              <a:buClrTx/>
-              <a:buSzTx/>
-              <a:buFontTx/>
-              <a:buNone/>
-              <a:tabLst/>
-              <a:defRPr/>
-            </a:pPr>
-            <a:endParaRPr lang="en-GB" dirty="0"/>
-          </a:p>
-          <a:p>
-            <a:r>
-              <a:rPr lang="en-GB" dirty="0"/>
-              <a:t>Conformance refinement actually suffers from a much wider range of issues from the ignorance problem, due to the larger variety in the abstract models it can represent.</a:t>
-            </a:r>
-          </a:p>
-          <a:p>
-            <a:endParaRPr lang="en-GB" dirty="0"/>
-          </a:p>
-          <a:p>
-            <a:r>
-              <a:rPr lang="en-GB" dirty="0"/>
-              <a:t>The ignorance problem is intrinsic to abstraction planning, due to its very nature, however, when you eliminate the dependency problem, such as what happens in offline planning, the effect is very minimal, and the solutions it finds are very reasonable.</a:t>
-            </a:r>
-          </a:p>
-          <a:p>
-            <a:endParaRPr lang="en-GB" dirty="0"/>
-          </a:p>
-          <a:p>
-            <a:r>
-              <a:rPr lang="en-GB" dirty="0"/>
-              <a:t>The ignorance problem is heavily exacerbated by the dependency problem.</a:t>
-            </a:r>
-          </a:p>
-          <a:p>
-            <a:endParaRPr lang="en-GB" dirty="0"/>
-          </a:p>
-          <a:p>
-            <a:r>
-              <a:rPr lang="en-GB" dirty="0"/>
-              <a:t>However, the dependency problem is alleviated in online planning, because any number of actions from the plan at the previous level can be refined simultaneously.</a:t>
-            </a:r>
-          </a:p>
-          <a:p>
-            <a:endParaRPr lang="en-GB" dirty="0"/>
-          </a:p>
-          <a:p>
-            <a:r>
-              <a:rPr lang="en-GB" dirty="0"/>
-              <a:t>Currently, the planner is based on a very naive way of dividing the problem, it simply splits it in half, since the test the domain I’ve been using contains there levels, you divide twice, so there are four partial problems at the ground level.</a:t>
+            <a:r>
+              <a:rPr lang="en-GB" dirty="0"/>
+              <a:t>The method is entirely general.</a:t>
             </a:r>
           </a:p>
         </p:txBody>
@@ -2051,7 +1823,7 @@
           <a:p>
             <a:fld id="{A04EEA3C-4D83-4EF4-A780-BEEAF6CB8D41}" type="slidenum">
               <a:rPr lang="en-GB" smtClean="0"/>
-              <a:t>12</a:t>
+              <a:t>13</a:t>
             </a:fld>
             <a:endParaRPr lang="en-GB"/>
           </a:p>
@@ -2060,7 +1832,7 @@
     </p:spTree>
     <p:extLst>
       <p:ext uri="{BB962C8B-B14F-4D97-AF65-F5344CB8AC3E}">
-        <p14:creationId xmlns:p14="http://schemas.microsoft.com/office/powerpoint/2010/main" val="2460424904"/>
+        <p14:creationId xmlns:p14="http://schemas.microsoft.com/office/powerpoint/2010/main" val="1664655959"/>
       </p:ext>
     </p:extLst>
   </p:cSld>
@@ -2131,7 +1903,139 @@
               <a:tabLst/>
               <a:defRPr/>
             </a:pPr>
-            <a:endParaRPr lang="en-GB" dirty="0"/>
+            <a:r>
+              <a:rPr lang="en-GB" sz="1200" dirty="0"/>
+              <a:t>So far, it seems the proposed approach is effective, but haven’t had a chance to compare much to other approaches.</a:t>
+            </a:r>
+          </a:p>
+          <a:p>
+            <a:pPr marL="0" marR="0" lvl="0" indent="0" algn="l" defTabSz="914400" rtl="0" eaLnBrk="1" fontAlgn="auto" latinLnBrk="0" hangingPunct="1">
+              <a:lnSpc>
+                <a:spcPct val="100000"/>
+              </a:lnSpc>
+              <a:spcBef>
+                <a:spcPts val="0"/>
+              </a:spcBef>
+              <a:spcAft>
+                <a:spcPts val="0"/>
+              </a:spcAft>
+              <a:buClrTx/>
+              <a:buSzTx/>
+              <a:buFontTx/>
+              <a:buNone/>
+              <a:tabLst/>
+              <a:defRPr/>
+            </a:pPr>
+            <a:endParaRPr lang="en-GB" sz="1200" dirty="0"/>
+          </a:p>
+          <a:p>
+            <a:pPr marL="0" marR="0" lvl="0" indent="0" algn="l" defTabSz="914400" rtl="0" eaLnBrk="1" fontAlgn="auto" latinLnBrk="0" hangingPunct="1">
+              <a:lnSpc>
+                <a:spcPct val="100000"/>
+              </a:lnSpc>
+              <a:spcBef>
+                <a:spcPts val="0"/>
+              </a:spcBef>
+              <a:spcAft>
+                <a:spcPts val="0"/>
+              </a:spcAft>
+              <a:buClrTx/>
+              <a:buSzTx/>
+              <a:buFontTx/>
+              <a:buNone/>
+              <a:tabLst/>
+              <a:defRPr/>
+            </a:pPr>
+            <a:r>
+              <a:rPr lang="en-GB" sz="1200" dirty="0"/>
+              <a:t>It would be very hard to find a heuristic for this problem since it involves combined logistics and manipulation.</a:t>
+            </a:r>
+          </a:p>
+          <a:p>
+            <a:pPr marL="0" marR="0" lvl="0" indent="0" algn="l" defTabSz="914400" rtl="0" eaLnBrk="1" fontAlgn="auto" latinLnBrk="0" hangingPunct="1">
+              <a:lnSpc>
+                <a:spcPct val="100000"/>
+              </a:lnSpc>
+              <a:spcBef>
+                <a:spcPts val="0"/>
+              </a:spcBef>
+              <a:spcAft>
+                <a:spcPts val="0"/>
+              </a:spcAft>
+              <a:buClrTx/>
+              <a:buSzTx/>
+              <a:buFontTx/>
+              <a:buNone/>
+              <a:tabLst/>
+              <a:defRPr/>
+            </a:pPr>
+            <a:endParaRPr lang="en-GB" sz="1200" dirty="0"/>
+          </a:p>
+          <a:p>
+            <a:pPr marL="0" marR="0" lvl="0" indent="0" algn="l" defTabSz="914400" rtl="0" eaLnBrk="1" fontAlgn="auto" latinLnBrk="0" hangingPunct="1">
+              <a:lnSpc>
+                <a:spcPct val="100000"/>
+              </a:lnSpc>
+              <a:spcBef>
+                <a:spcPts val="0"/>
+              </a:spcBef>
+              <a:spcAft>
+                <a:spcPts val="0"/>
+              </a:spcAft>
+              <a:buClrTx/>
+              <a:buSzTx/>
+              <a:buFontTx/>
+              <a:buNone/>
+              <a:tabLst/>
+              <a:defRPr/>
+            </a:pPr>
+            <a:r>
+              <a:rPr lang="en-GB" sz="1200" dirty="0"/>
+              <a:t>Not sure how well this will generalise or whether these trends will continue.</a:t>
+            </a:r>
+          </a:p>
+          <a:p>
+            <a:pPr marL="0" marR="0" lvl="0" indent="0" algn="l" defTabSz="914400" rtl="0" eaLnBrk="1" fontAlgn="auto" latinLnBrk="0" hangingPunct="1">
+              <a:lnSpc>
+                <a:spcPct val="100000"/>
+              </a:lnSpc>
+              <a:spcBef>
+                <a:spcPts val="0"/>
+              </a:spcBef>
+              <a:spcAft>
+                <a:spcPts val="0"/>
+              </a:spcAft>
+              <a:buClrTx/>
+              <a:buSzTx/>
+              <a:buFontTx/>
+              <a:buNone/>
+              <a:tabLst/>
+              <a:defRPr/>
+            </a:pPr>
+            <a:endParaRPr lang="en-GB" sz="1200" dirty="0"/>
+          </a:p>
+          <a:p>
+            <a:pPr marL="0" marR="0" lvl="0" indent="0" algn="l" defTabSz="914400" rtl="0" eaLnBrk="1" fontAlgn="auto" latinLnBrk="0" hangingPunct="1">
+              <a:lnSpc>
+                <a:spcPct val="100000"/>
+              </a:lnSpc>
+              <a:spcBef>
+                <a:spcPts val="0"/>
+              </a:spcBef>
+              <a:spcAft>
+                <a:spcPts val="0"/>
+              </a:spcAft>
+              <a:buClrTx/>
+              <a:buSzTx/>
+              <a:buFontTx/>
+              <a:buNone/>
+              <a:tabLst/>
+              <a:defRPr/>
+            </a:pPr>
+            <a:r>
+              <a:rPr lang="en-GB" sz="1200" dirty="0"/>
+              <a:t>I have found that for more complex problems, e.g. with twice as many blocks, that most abstract plan took 5-6 minutes to find, whereas the ground level took only 30-40 seconds.</a:t>
+            </a:r>
           </a:p>
         </p:txBody>
       </p:sp>
@@ -2161,7 +2065,7 @@
     </p:spTree>
     <p:extLst>
       <p:ext uri="{BB962C8B-B14F-4D97-AF65-F5344CB8AC3E}">
-        <p14:creationId xmlns:p14="http://schemas.microsoft.com/office/powerpoint/2010/main" val="985106522"/>
+        <p14:creationId xmlns:p14="http://schemas.microsoft.com/office/powerpoint/2010/main" val="3591377660"/>
       </p:ext>
     </p:extLst>
   </p:cSld>
@@ -2234,15 +2138,69 @@
             </a:pPr>
             <a:r>
               <a:rPr lang="en-GB" dirty="0"/>
-              <a:t>The order no longer matters due to this generalisation of enabling constraints induced by the </a:t>
-            </a:r>
-            <a:r>
-              <a:rPr lang="en-GB"/>
-              <a:t>condensed domain </a:t>
-            </a:r>
-            <a:r>
-              <a:rPr lang="en-GB" dirty="0"/>
-              <a:t>model.</a:t>
+              <a:t>Plans are rarely optimal in the classical sense.</a:t>
+            </a:r>
+          </a:p>
+          <a:p>
+            <a:pPr marL="0" marR="0" lvl="0" indent="0" algn="l" defTabSz="914400" rtl="0" eaLnBrk="1" fontAlgn="auto" latinLnBrk="0" hangingPunct="1">
+              <a:lnSpc>
+                <a:spcPct val="100000"/>
+              </a:lnSpc>
+              <a:spcBef>
+                <a:spcPts val="0"/>
+              </a:spcBef>
+              <a:spcAft>
+                <a:spcPts val="0"/>
+              </a:spcAft>
+              <a:buClrTx/>
+              <a:buSzTx/>
+              <a:buFontTx/>
+              <a:buNone/>
+              <a:tabLst/>
+              <a:defRPr/>
+            </a:pPr>
+            <a:endParaRPr lang="en-GB" dirty="0"/>
+          </a:p>
+          <a:p>
+            <a:r>
+              <a:rPr lang="en-GB" dirty="0"/>
+              <a:t>Conformance refinement actually suffers from a much wider range of issues from the ignorance problem, due to the larger variety in the abstract models it can represent.</a:t>
+            </a:r>
+          </a:p>
+          <a:p>
+            <a:endParaRPr lang="en-GB" dirty="0"/>
+          </a:p>
+          <a:p>
+            <a:r>
+              <a:rPr lang="en-GB" dirty="0"/>
+              <a:t>The ignorance problem is intrinsic to abstraction planning, due to its very nature, however, when you eliminate the dependency problem, such as what happens in offline planning, the effect is very minimal, and the solutions it finds are very reasonable.</a:t>
+            </a:r>
+          </a:p>
+          <a:p>
+            <a:endParaRPr lang="en-GB" dirty="0"/>
+          </a:p>
+          <a:p>
+            <a:r>
+              <a:rPr lang="en-GB" dirty="0"/>
+              <a:t>The ignorance problem is heavily exacerbated by the dependency problem.</a:t>
+            </a:r>
+          </a:p>
+          <a:p>
+            <a:endParaRPr lang="en-GB" dirty="0"/>
+          </a:p>
+          <a:p>
+            <a:r>
+              <a:rPr lang="en-GB" dirty="0"/>
+              <a:t>However, the dependency problem is alleviated in online planning, because any number of actions from the plan at the previous level can be refined simultaneously.</a:t>
+            </a:r>
+          </a:p>
+          <a:p>
+            <a:endParaRPr lang="en-GB" dirty="0"/>
+          </a:p>
+          <a:p>
+            <a:r>
+              <a:rPr lang="en-GB" dirty="0"/>
+              <a:t>Currently, the planner is based on a very naive way of dividing the problem, it simply splits it in half, since the test the domain I’ve been using contains there levels, you divide twice, so there are four partial problems at the ground level.</a:t>
             </a:r>
           </a:p>
         </p:txBody>
@@ -2273,7 +2231,7 @@
     </p:spTree>
     <p:extLst>
       <p:ext uri="{BB962C8B-B14F-4D97-AF65-F5344CB8AC3E}">
-        <p14:creationId xmlns:p14="http://schemas.microsoft.com/office/powerpoint/2010/main" val="1215014776"/>
+        <p14:creationId xmlns:p14="http://schemas.microsoft.com/office/powerpoint/2010/main" val="2460424904"/>
       </p:ext>
     </p:extLst>
   </p:cSld>
@@ -2327,10 +2285,24 @@
           <a:bodyPr/>
           <a:lstStyle/>
           <a:p>
-            <a:r>
-              <a:rPr lang="en-GB" dirty="0"/>
-              <a:t>If we refine all three actions simultaneously, we get this plan.</a:t>
-            </a:r>
+            <a:pPr marL="0" marR="0" lvl="0" indent="0" algn="l" defTabSz="914400" rtl="0" eaLnBrk="1" fontAlgn="auto" latinLnBrk="0" hangingPunct="1">
+              <a:lnSpc>
+                <a:spcPct val="100000"/>
+              </a:lnSpc>
+              <a:spcBef>
+                <a:spcPts val="0"/>
+              </a:spcBef>
+              <a:spcAft>
+                <a:spcPts val="0"/>
+              </a:spcAft>
+              <a:buClrTx/>
+              <a:buSzTx/>
+              <a:buFontTx/>
+              <a:buNone/>
+              <a:tabLst/>
+              <a:defRPr/>
+            </a:pPr>
+            <a:endParaRPr lang="en-GB" dirty="0"/>
           </a:p>
         </p:txBody>
       </p:sp>
@@ -2360,7 +2332,7 @@
     </p:spTree>
     <p:extLst>
       <p:ext uri="{BB962C8B-B14F-4D97-AF65-F5344CB8AC3E}">
-        <p14:creationId xmlns:p14="http://schemas.microsoft.com/office/powerpoint/2010/main" val="1895049237"/>
+        <p14:creationId xmlns:p14="http://schemas.microsoft.com/office/powerpoint/2010/main" val="985106522"/>
       </p:ext>
     </p:extLst>
   </p:cSld>
@@ -2414,18 +2386,34 @@
           <a:bodyPr/>
           <a:lstStyle/>
           <a:p>
-            <a:r>
-              <a:rPr lang="en-GB" dirty="0"/>
-              <a:t>If we refine them separately, we get this plan.</a:t>
-            </a:r>
-          </a:p>
-          <a:p>
-            <a:endParaRPr lang="en-GB" dirty="0"/>
-          </a:p>
-          <a:p>
-            <a:r>
-              <a:rPr lang="en-GB" dirty="0"/>
-              <a:t>The robot does not consider that it will need to grasp the handle as the immediately next subgoal, if it could, then it would insert addition actions to achieve that.</a:t>
+            <a:pPr marL="0" marR="0" lvl="0" indent="0" algn="l" defTabSz="914400" rtl="0" eaLnBrk="1" fontAlgn="auto" latinLnBrk="0" hangingPunct="1">
+              <a:lnSpc>
+                <a:spcPct val="100000"/>
+              </a:lnSpc>
+              <a:spcBef>
+                <a:spcPts val="0"/>
+              </a:spcBef>
+              <a:spcAft>
+                <a:spcPts val="0"/>
+              </a:spcAft>
+              <a:buClrTx/>
+              <a:buSzTx/>
+              <a:buFontTx/>
+              <a:buNone/>
+              <a:tabLst/>
+              <a:defRPr/>
+            </a:pPr>
+            <a:r>
+              <a:rPr lang="en-GB" dirty="0"/>
+              <a:t>The order no longer matters due to this generalisation of enabling constraints induced by the </a:t>
+            </a:r>
+            <a:r>
+              <a:rPr lang="en-GB"/>
+              <a:t>condensed domain </a:t>
+            </a:r>
+            <a:r>
+              <a:rPr lang="en-GB" dirty="0"/>
+              <a:t>model.</a:t>
             </a:r>
           </a:p>
         </p:txBody>
@@ -2456,7 +2444,7 @@
     </p:spTree>
     <p:extLst>
       <p:ext uri="{BB962C8B-B14F-4D97-AF65-F5344CB8AC3E}">
-        <p14:creationId xmlns:p14="http://schemas.microsoft.com/office/powerpoint/2010/main" val="831383161"/>
+        <p14:creationId xmlns:p14="http://schemas.microsoft.com/office/powerpoint/2010/main" val="1215014776"/>
       </p:ext>
     </p:extLst>
   </p:cSld>
@@ -2512,7 +2500,7 @@
           <a:p>
             <a:r>
               <a:rPr lang="en-GB" dirty="0"/>
-              <a:t>The method is entirely general.</a:t>
+              <a:t>If we refine all three actions simultaneously, we get this plan.</a:t>
             </a:r>
           </a:p>
         </p:txBody>
@@ -2543,7 +2531,7 @@
     </p:spTree>
     <p:extLst>
       <p:ext uri="{BB962C8B-B14F-4D97-AF65-F5344CB8AC3E}">
-        <p14:creationId xmlns:p14="http://schemas.microsoft.com/office/powerpoint/2010/main" val="1664655959"/>
+        <p14:creationId xmlns:p14="http://schemas.microsoft.com/office/powerpoint/2010/main" val="1895049237"/>
       </p:ext>
     </p:extLst>
   </p:cSld>
@@ -2597,7 +2585,19 @@
           <a:bodyPr/>
           <a:lstStyle/>
           <a:p>
+            <a:r>
+              <a:rPr lang="en-GB" dirty="0"/>
+              <a:t>If we refine them separately, we get this plan.</a:t>
+            </a:r>
+          </a:p>
+          <a:p>
             <a:endParaRPr lang="en-GB" dirty="0"/>
+          </a:p>
+          <a:p>
+            <a:r>
+              <a:rPr lang="en-GB" dirty="0"/>
+              <a:t>The robot does not consider that it will need to grasp the handle as the immediately next subgoal, if it could, then it would insert addition actions to achieve that.</a:t>
+            </a:r>
           </a:p>
         </p:txBody>
       </p:sp>
@@ -2618,7 +2618,7 @@
           <a:p>
             <a:fld id="{A04EEA3C-4D83-4EF4-A780-BEEAF6CB8D41}" type="slidenum">
               <a:rPr lang="en-GB" smtClean="0"/>
-              <a:t>20</a:t>
+              <a:t>19</a:t>
             </a:fld>
             <a:endParaRPr lang="en-GB"/>
           </a:p>
@@ -2627,7 +2627,7 @@
     </p:spTree>
     <p:extLst>
       <p:ext uri="{BB962C8B-B14F-4D97-AF65-F5344CB8AC3E}">
-        <p14:creationId xmlns:p14="http://schemas.microsoft.com/office/powerpoint/2010/main" val="1455877763"/>
+        <p14:creationId xmlns:p14="http://schemas.microsoft.com/office/powerpoint/2010/main" val="831383161"/>
       </p:ext>
     </p:extLst>
   </p:cSld>
@@ -4059,7 +4059,7 @@
           <a:p>
             <a:fld id="{A04EEA3C-4D83-4EF4-A780-BEEAF6CB8D41}" type="slidenum">
               <a:rPr lang="en-GB" smtClean="0"/>
-              <a:t>7</a:t>
+              <a:t>8</a:t>
             </a:fld>
             <a:endParaRPr lang="en-GB"/>
           </a:p>
@@ -4143,7 +4143,7 @@
           <a:p>
             <a:fld id="{A04EEA3C-4D83-4EF4-A780-BEEAF6CB8D41}" type="slidenum">
               <a:rPr lang="en-GB" smtClean="0"/>
-              <a:t>8</a:t>
+              <a:t>9</a:t>
             </a:fld>
             <a:endParaRPr lang="en-GB"/>
           </a:p>
@@ -4462,7 +4462,7 @@
           <a:p>
             <a:fld id="{A04EEA3C-4D83-4EF4-A780-BEEAF6CB8D41}" type="slidenum">
               <a:rPr lang="en-GB" smtClean="0"/>
-              <a:t>9</a:t>
+              <a:t>10</a:t>
             </a:fld>
             <a:endParaRPr lang="en-GB"/>
           </a:p>
@@ -4567,7 +4567,7 @@
           <a:p>
             <a:fld id="{A04EEA3C-4D83-4EF4-A780-BEEAF6CB8D41}" type="slidenum">
               <a:rPr lang="en-GB" smtClean="0"/>
-              <a:t>10</a:t>
+              <a:t>11</a:t>
             </a:fld>
             <a:endParaRPr lang="en-GB"/>
           </a:p>
@@ -4735,7 +4735,7 @@
           <a:p>
             <a:fld id="{CD0D268A-B715-4021-92C1-4D75AC8486B1}" type="datetimeFigureOut">
               <a:rPr lang="en-GB" smtClean="0"/>
-              <a:t>06/06/2021</a:t>
+              <a:t>19/11/2022</a:t>
             </a:fld>
             <a:endParaRPr lang="en-GB"/>
           </a:p>
@@ -4935,7 +4935,7 @@
           <a:p>
             <a:fld id="{CD0D268A-B715-4021-92C1-4D75AC8486B1}" type="datetimeFigureOut">
               <a:rPr lang="en-GB" smtClean="0"/>
-              <a:t>06/06/2021</a:t>
+              <a:t>19/11/2022</a:t>
             </a:fld>
             <a:endParaRPr lang="en-GB"/>
           </a:p>
@@ -5145,7 +5145,7 @@
           <a:p>
             <a:fld id="{CD0D268A-B715-4021-92C1-4D75AC8486B1}" type="datetimeFigureOut">
               <a:rPr lang="en-GB" smtClean="0"/>
-              <a:t>06/06/2021</a:t>
+              <a:t>19/11/2022</a:t>
             </a:fld>
             <a:endParaRPr lang="en-GB"/>
           </a:p>
@@ -5345,7 +5345,7 @@
           <a:p>
             <a:fld id="{CD0D268A-B715-4021-92C1-4D75AC8486B1}" type="datetimeFigureOut">
               <a:rPr lang="en-GB" smtClean="0"/>
-              <a:t>06/06/2021</a:t>
+              <a:t>19/11/2022</a:t>
             </a:fld>
             <a:endParaRPr lang="en-GB"/>
           </a:p>
@@ -5621,7 +5621,7 @@
           <a:p>
             <a:fld id="{CD0D268A-B715-4021-92C1-4D75AC8486B1}" type="datetimeFigureOut">
               <a:rPr lang="en-GB" smtClean="0"/>
-              <a:t>06/06/2021</a:t>
+              <a:t>19/11/2022</a:t>
             </a:fld>
             <a:endParaRPr lang="en-GB"/>
           </a:p>
@@ -5889,7 +5889,7 @@
           <a:p>
             <a:fld id="{CD0D268A-B715-4021-92C1-4D75AC8486B1}" type="datetimeFigureOut">
               <a:rPr lang="en-GB" smtClean="0"/>
-              <a:t>06/06/2021</a:t>
+              <a:t>19/11/2022</a:t>
             </a:fld>
             <a:endParaRPr lang="en-GB"/>
           </a:p>
@@ -6304,7 +6304,7 @@
           <a:p>
             <a:fld id="{CD0D268A-B715-4021-92C1-4D75AC8486B1}" type="datetimeFigureOut">
               <a:rPr lang="en-GB" smtClean="0"/>
-              <a:t>06/06/2021</a:t>
+              <a:t>19/11/2022</a:t>
             </a:fld>
             <a:endParaRPr lang="en-GB"/>
           </a:p>
@@ -6446,7 +6446,7 @@
           <a:p>
             <a:fld id="{CD0D268A-B715-4021-92C1-4D75AC8486B1}" type="datetimeFigureOut">
               <a:rPr lang="en-GB" smtClean="0"/>
-              <a:t>06/06/2021</a:t>
+              <a:t>19/11/2022</a:t>
             </a:fld>
             <a:endParaRPr lang="en-GB"/>
           </a:p>
@@ -6559,7 +6559,7 @@
           <a:p>
             <a:fld id="{CD0D268A-B715-4021-92C1-4D75AC8486B1}" type="datetimeFigureOut">
               <a:rPr lang="en-GB" smtClean="0"/>
-              <a:t>06/06/2021</a:t>
+              <a:t>19/11/2022</a:t>
             </a:fld>
             <a:endParaRPr lang="en-GB"/>
           </a:p>
@@ -6872,7 +6872,7 @@
           <a:p>
             <a:fld id="{CD0D268A-B715-4021-92C1-4D75AC8486B1}" type="datetimeFigureOut">
               <a:rPr lang="en-GB" smtClean="0"/>
-              <a:t>06/06/2021</a:t>
+              <a:t>19/11/2022</a:t>
             </a:fld>
             <a:endParaRPr lang="en-GB"/>
           </a:p>
@@ -7161,7 +7161,7 @@
           <a:p>
             <a:fld id="{CD0D268A-B715-4021-92C1-4D75AC8486B1}" type="datetimeFigureOut">
               <a:rPr lang="en-GB" smtClean="0"/>
-              <a:t>06/06/2021</a:t>
+              <a:t>19/11/2022</a:t>
             </a:fld>
             <a:endParaRPr lang="en-GB"/>
           </a:p>
@@ -7404,7 +7404,7 @@
           <a:p>
             <a:fld id="{CD0D268A-B715-4021-92C1-4D75AC8486B1}" type="datetimeFigureOut">
               <a:rPr lang="en-GB" smtClean="0"/>
-              <a:t>06/06/2021</a:t>
+              <a:t>19/11/2022</a:t>
             </a:fld>
             <a:endParaRPr lang="en-GB"/>
           </a:p>
@@ -7951,6 +7951,155 @@
           <p:cNvPr id="2" name="Title 1">
             <a:extLst>
               <a:ext uri="{FF2B5EF4-FFF2-40B4-BE49-F238E27FC236}">
+                <a16:creationId xmlns:a16="http://schemas.microsoft.com/office/drawing/2014/main" id="{CEF73766-C71F-4039-94C4-939D6325EE83}"/>
+              </a:ext>
+            </a:extLst>
+          </p:cNvPr>
+          <p:cNvSpPr>
+            <a:spLocks noGrp="1"/>
+          </p:cNvSpPr>
+          <p:nvPr>
+            <p:ph type="title"/>
+          </p:nvPr>
+        </p:nvSpPr>
+        <p:spPr/>
+        <p:txBody>
+          <a:bodyPr/>
+          <a:lstStyle/>
+          <a:p>
+            <a:pPr algn="ctr"/>
+            <a:r>
+              <a:rPr lang="en-GB" b="1" u="sng" dirty="0"/>
+              <a:t>Conformance Refinement</a:t>
+            </a:r>
+          </a:p>
+        </p:txBody>
+      </p:sp>
+      <p:sp>
+        <p:nvSpPr>
+          <p:cNvPr id="3" name="Content Placeholder 2">
+            <a:extLst>
+              <a:ext uri="{FF2B5EF4-FFF2-40B4-BE49-F238E27FC236}">
+                <a16:creationId xmlns:a16="http://schemas.microsoft.com/office/drawing/2014/main" id="{8379E798-EA76-44E2-A5D3-9C3D5E52B554}"/>
+              </a:ext>
+            </a:extLst>
+          </p:cNvPr>
+          <p:cNvSpPr>
+            <a:spLocks noGrp="1"/>
+          </p:cNvSpPr>
+          <p:nvPr>
+            <p:ph idx="1"/>
+          </p:nvPr>
+        </p:nvSpPr>
+        <p:spPr/>
+        <p:txBody>
+          <a:bodyPr>
+            <a:normAutofit fontScale="92500" lnSpcReduction="10000"/>
+          </a:bodyPr>
+          <a:lstStyle/>
+          <a:p>
+            <a:pPr marL="0" indent="0" algn="ctr">
+              <a:buNone/>
+            </a:pPr>
+            <a:r>
+              <a:rPr lang="en-GB" dirty="0"/>
+              <a:t>Conformance refinement requires that a plan generated over an abstraction hierarchy remains structurally similar and achieve same effects at all levels.</a:t>
+            </a:r>
+          </a:p>
+          <a:p>
+            <a:pPr marL="0" indent="0">
+              <a:buNone/>
+            </a:pPr>
+            <a:endParaRPr lang="en-GB" sz="900" dirty="0"/>
+          </a:p>
+          <a:p>
+            <a:r>
+              <a:rPr lang="en-GB" dirty="0"/>
+              <a:t>An attempt to make ASP based planners general, expressive and fast.</a:t>
+            </a:r>
+          </a:p>
+          <a:p>
+            <a:r>
+              <a:rPr lang="en-GB" dirty="0"/>
+              <a:t>Takes the human approach, only decide on the abstract stages of the plan initially, deals with the details later and as they emerge.</a:t>
+            </a:r>
+          </a:p>
+          <a:p>
+            <a:r>
+              <a:rPr lang="en-GB" dirty="0"/>
+              <a:t>Provides better integration of planning and diagnostics.</a:t>
+            </a:r>
+          </a:p>
+          <a:p>
+            <a:pPr marL="0" indent="0">
+              <a:buNone/>
+            </a:pPr>
+            <a:endParaRPr lang="en-GB" sz="900" dirty="0"/>
+          </a:p>
+          <a:p>
+            <a:r>
+              <a:rPr lang="en-GB" dirty="0"/>
+              <a:t>Refines based on the effects of planned actions passed as subgoals:</a:t>
+            </a:r>
+          </a:p>
+          <a:p>
+            <a:pPr lvl="1"/>
+            <a:r>
+              <a:rPr lang="en-GB" dirty="0"/>
+              <a:t>More expressive abstractions, any abstract model with a state space mapping,</a:t>
+            </a:r>
+          </a:p>
+          <a:p>
+            <a:pPr lvl="1"/>
+            <a:r>
+              <a:rPr lang="en-GB" dirty="0"/>
+              <a:t>Allows refinement of any number of actions at once,</a:t>
+            </a:r>
+          </a:p>
+          <a:p>
+            <a:pPr lvl="1"/>
+            <a:r>
+              <a:rPr lang="en-GB" dirty="0"/>
+              <a:t>Allows flexible online plan generation and repair.</a:t>
+            </a:r>
+          </a:p>
+        </p:txBody>
+      </p:sp>
+    </p:spTree>
+    <p:extLst>
+      <p:ext uri="{BB962C8B-B14F-4D97-AF65-F5344CB8AC3E}">
+        <p14:creationId xmlns:p14="http://schemas.microsoft.com/office/powerpoint/2010/main" val="709079334"/>
+      </p:ext>
+    </p:extLst>
+  </p:cSld>
+  <p:clrMapOvr>
+    <a:masterClrMapping/>
+  </p:clrMapOvr>
+</p:sld>
+</file>
+
+<file path=ppt/slides/slide11.xml><?xml version="1.0" encoding="utf-8"?>
+<p:sld xmlns:a="http://schemas.openxmlformats.org/drawingml/2006/main" xmlns:r="http://schemas.openxmlformats.org/officeDocument/2006/relationships" xmlns:p="http://schemas.openxmlformats.org/presentationml/2006/main">
+  <p:cSld>
+    <p:spTree>
+      <p:nvGrpSpPr>
+        <p:cNvPr id="1" name=""/>
+        <p:cNvGrpSpPr/>
+        <p:nvPr/>
+      </p:nvGrpSpPr>
+      <p:grpSpPr>
+        <a:xfrm>
+          <a:off x="0" y="0"/>
+          <a:ext cx="0" cy="0"/>
+          <a:chOff x="0" y="0"/>
+          <a:chExt cx="0" cy="0"/>
+        </a:xfrm>
+      </p:grpSpPr>
+      <p:sp>
+        <p:nvSpPr>
+          <p:cNvPr id="2" name="Title 1">
+            <a:extLst>
+              <a:ext uri="{FF2B5EF4-FFF2-40B4-BE49-F238E27FC236}">
                 <a16:creationId xmlns:a16="http://schemas.microsoft.com/office/drawing/2014/main" id="{BE93412B-4B43-4B55-813F-9FF5732961FE}"/>
               </a:ext>
             </a:extLst>
@@ -8062,7 +8211,249 @@
 </p:sld>
 </file>
 
-<file path=ppt/slides/slide11.xml><?xml version="1.0" encoding="utf-8"?>
+<file path=ppt/slides/slide12.xml><?xml version="1.0" encoding="utf-8"?>
+<p:sld xmlns:a="http://schemas.openxmlformats.org/drawingml/2006/main" xmlns:r="http://schemas.openxmlformats.org/officeDocument/2006/relationships" xmlns:p="http://schemas.openxmlformats.org/presentationml/2006/main">
+  <p:cSld>
+    <p:spTree>
+      <p:nvGrpSpPr>
+        <p:cNvPr id="1" name=""/>
+        <p:cNvGrpSpPr/>
+        <p:nvPr/>
+      </p:nvGrpSpPr>
+      <p:grpSpPr>
+        <a:xfrm>
+          <a:off x="0" y="0"/>
+          <a:ext cx="0" cy="0"/>
+          <a:chOff x="0" y="0"/>
+          <a:chExt cx="0" cy="0"/>
+        </a:xfrm>
+      </p:grpSpPr>
+      <p:sp>
+        <p:nvSpPr>
+          <p:cNvPr id="2" name="Title 1">
+            <a:extLst>
+              <a:ext uri="{FF2B5EF4-FFF2-40B4-BE49-F238E27FC236}">
+                <a16:creationId xmlns:a16="http://schemas.microsoft.com/office/drawing/2014/main" id="{C85E89E5-8E92-48CD-B25B-D43EF6966868}"/>
+              </a:ext>
+            </a:extLst>
+          </p:cNvPr>
+          <p:cNvSpPr>
+            <a:spLocks noGrp="1"/>
+          </p:cNvSpPr>
+          <p:nvPr>
+            <p:ph type="title"/>
+          </p:nvPr>
+        </p:nvSpPr>
+        <p:spPr/>
+        <p:txBody>
+          <a:bodyPr/>
+          <a:lstStyle/>
+          <a:p>
+            <a:r>
+              <a:rPr lang="en-GB" b="1" u="sng" dirty="0"/>
+              <a:t>Supports Different Abstract Models</a:t>
+            </a:r>
+          </a:p>
+        </p:txBody>
+      </p:sp>
+      <p:sp>
+        <p:nvSpPr>
+          <p:cNvPr id="3" name="Content Placeholder 2">
+            <a:extLst>
+              <a:ext uri="{FF2B5EF4-FFF2-40B4-BE49-F238E27FC236}">
+                <a16:creationId xmlns:a16="http://schemas.microsoft.com/office/drawing/2014/main" id="{347F735C-6326-486A-808C-AFF81DEF1B00}"/>
+              </a:ext>
+            </a:extLst>
+          </p:cNvPr>
+          <p:cNvSpPr>
+            <a:spLocks noGrp="1"/>
+          </p:cNvSpPr>
+          <p:nvPr>
+            <p:ph idx="1"/>
+          </p:nvPr>
+        </p:nvSpPr>
+        <p:spPr/>
+        <p:txBody>
+          <a:bodyPr>
+            <a:normAutofit lnSpcReduction="10000"/>
+          </a:bodyPr>
+          <a:lstStyle/>
+          <a:p>
+            <a:r>
+              <a:rPr lang="en-GB" b="1" dirty="0"/>
+              <a:t>Relaxed Models: </a:t>
+            </a:r>
+            <a:r>
+              <a:rPr lang="en-GB" dirty="0"/>
+              <a:t>Remove planning constraints, e.g. preconditions of actions, to shorten plans and reduce search spaces.</a:t>
+            </a:r>
+          </a:p>
+          <a:p>
+            <a:r>
+              <a:rPr lang="en-GB" b="1" dirty="0"/>
+              <a:t>Condensed Models: </a:t>
+            </a:r>
+            <a:r>
+              <a:rPr lang="en-GB" dirty="0"/>
+              <a:t>Remove the detailed parts/pieces of entities, combine them into abstract descriptors, reducing state space and plan length.</a:t>
+            </a:r>
+          </a:p>
+          <a:p>
+            <a:r>
+              <a:rPr lang="en-GB" b="1" dirty="0"/>
+              <a:t>Discontinuous Models: </a:t>
+            </a:r>
+            <a:r>
+              <a:rPr lang="en-GB" dirty="0"/>
+              <a:t>Ignore inertia, e.g. a robot is simultaneously in every location it has previously been, if we can get there once, we can get there again, reduces plan lengths.</a:t>
+            </a:r>
+          </a:p>
+          <a:p>
+            <a:r>
+              <a:rPr lang="en-GB" b="1" dirty="0"/>
+              <a:t>Tasking Models: </a:t>
+            </a:r>
+            <a:r>
+              <a:rPr lang="en-GB" dirty="0"/>
+              <a:t>Split the planning problem into a sequence of very high level tasks, allows more extensive problem division, but much more bespoke to each application domain.</a:t>
+            </a:r>
+          </a:p>
+        </p:txBody>
+      </p:sp>
+    </p:spTree>
+    <p:extLst>
+      <p:ext uri="{BB962C8B-B14F-4D97-AF65-F5344CB8AC3E}">
+        <p14:creationId xmlns:p14="http://schemas.microsoft.com/office/powerpoint/2010/main" val="1003886819"/>
+      </p:ext>
+    </p:extLst>
+  </p:cSld>
+  <p:clrMapOvr>
+    <a:masterClrMapping/>
+  </p:clrMapOvr>
+</p:sld>
+</file>
+
+<file path=ppt/slides/slide13.xml><?xml version="1.0" encoding="utf-8"?>
+<p:sld xmlns:a="http://schemas.openxmlformats.org/drawingml/2006/main" xmlns:r="http://schemas.openxmlformats.org/officeDocument/2006/relationships" xmlns:p="http://schemas.openxmlformats.org/presentationml/2006/main">
+  <p:cSld>
+    <p:spTree>
+      <p:nvGrpSpPr>
+        <p:cNvPr id="1" name=""/>
+        <p:cNvGrpSpPr/>
+        <p:nvPr/>
+      </p:nvGrpSpPr>
+      <p:grpSpPr>
+        <a:xfrm>
+          <a:off x="0" y="0"/>
+          <a:ext cx="0" cy="0"/>
+          <a:chOff x="0" y="0"/>
+          <a:chExt cx="0" cy="0"/>
+        </a:xfrm>
+      </p:grpSpPr>
+      <p:sp>
+        <p:nvSpPr>
+          <p:cNvPr id="2" name="Title 1">
+            <a:extLst>
+              <a:ext uri="{FF2B5EF4-FFF2-40B4-BE49-F238E27FC236}">
+                <a16:creationId xmlns:a16="http://schemas.microsoft.com/office/drawing/2014/main" id="{16327F63-4BA7-49F9-A5FB-363A3D6C6113}"/>
+              </a:ext>
+            </a:extLst>
+          </p:cNvPr>
+          <p:cNvSpPr>
+            <a:spLocks noGrp="1"/>
+          </p:cNvSpPr>
+          <p:nvPr>
+            <p:ph type="title"/>
+          </p:nvPr>
+        </p:nvSpPr>
+        <p:spPr/>
+        <p:txBody>
+          <a:bodyPr/>
+          <a:lstStyle/>
+          <a:p>
+            <a:pPr algn="ctr"/>
+            <a:r>
+              <a:rPr lang="en-GB" b="1" u="sng" dirty="0"/>
+              <a:t>Allows Hierarchical Plan Repair</a:t>
+            </a:r>
+          </a:p>
+        </p:txBody>
+      </p:sp>
+      <p:sp>
+        <p:nvSpPr>
+          <p:cNvPr id="3" name="Content Placeholder 2">
+            <a:extLst>
+              <a:ext uri="{FF2B5EF4-FFF2-40B4-BE49-F238E27FC236}">
+                <a16:creationId xmlns:a16="http://schemas.microsoft.com/office/drawing/2014/main" id="{DB55EE6F-ED43-4386-B01C-26CEA275602D}"/>
+              </a:ext>
+            </a:extLst>
+          </p:cNvPr>
+          <p:cNvSpPr>
+            <a:spLocks noGrp="1"/>
+          </p:cNvSpPr>
+          <p:nvPr>
+            <p:ph idx="1"/>
+          </p:nvPr>
+        </p:nvSpPr>
+        <p:spPr/>
+        <p:txBody>
+          <a:bodyPr/>
+          <a:lstStyle/>
+          <a:p>
+            <a:r>
+              <a:rPr lang="en-GB" dirty="0"/>
+              <a:t>Deals with plan failure efficiently.</a:t>
+            </a:r>
+          </a:p>
+          <a:p>
+            <a:r>
+              <a:rPr lang="en-GB" dirty="0"/>
+              <a:t>Diagnostics and identification of the failed partial plan(s):</a:t>
+            </a:r>
+          </a:p>
+          <a:p>
+            <a:pPr lvl="1"/>
+            <a:r>
+              <a:rPr lang="en-GB" dirty="0"/>
+              <a:t>Hierarchical nature of plans (formed by sequences of partial plans) means that only the parts of plans that have failed need to be regenerated, this is called plan repair,</a:t>
+            </a:r>
+          </a:p>
+          <a:p>
+            <a:pPr lvl="1"/>
+            <a:r>
+              <a:rPr lang="en-GB" dirty="0"/>
+              <a:t>Repaired plans tend to get progressively worse over time,</a:t>
+            </a:r>
+          </a:p>
+          <a:p>
+            <a:pPr lvl="1"/>
+            <a:r>
+              <a:rPr lang="en-GB" dirty="0"/>
+              <a:t>Doesn’t need any additional knowledge to support this.</a:t>
+            </a:r>
+          </a:p>
+          <a:p>
+            <a:r>
+              <a:rPr lang="en-GB" dirty="0"/>
+              <a:t>May also be possible to determine if a goal can not longer be achieved and reject it, this kind of “goal reasoning” is usually difficult to support.</a:t>
+            </a:r>
+          </a:p>
+        </p:txBody>
+      </p:sp>
+    </p:spTree>
+    <p:extLst>
+      <p:ext uri="{BB962C8B-B14F-4D97-AF65-F5344CB8AC3E}">
+        <p14:creationId xmlns:p14="http://schemas.microsoft.com/office/powerpoint/2010/main" val="2855345987"/>
+      </p:ext>
+    </p:extLst>
+  </p:cSld>
+  <p:clrMapOvr>
+    <a:masterClrMapping/>
+  </p:clrMapOvr>
+</p:sld>
+</file>
+
+<file path=ppt/slides/slide14.xml><?xml version="1.0" encoding="utf-8"?>
 <p:sld xmlns:a="http://schemas.openxmlformats.org/drawingml/2006/main" xmlns:r="http://schemas.openxmlformats.org/officeDocument/2006/relationships" xmlns:p="http://schemas.openxmlformats.org/presentationml/2006/main">
   <p:cSld>
     <p:spTree>
@@ -8198,7 +8589,7 @@
 </p:sld>
 </file>
 
-<file path=ppt/slides/slide12.xml><?xml version="1.0" encoding="utf-8"?>
+<file path=ppt/slides/slide15.xml><?xml version="1.0" encoding="utf-8"?>
 <p:sld xmlns:a="http://schemas.openxmlformats.org/drawingml/2006/main" xmlns:r="http://schemas.openxmlformats.org/officeDocument/2006/relationships" xmlns:p="http://schemas.openxmlformats.org/presentationml/2006/main">
   <p:cSld>
     <p:spTree>
@@ -8351,157 +8742,8 @@
 </p:sld>
 </file>
 
-<file path=ppt/slides/slide13.xml><?xml version="1.0" encoding="utf-8"?>
+<file path=ppt/slides/slide16.xml><?xml version="1.0" encoding="utf-8"?>
 <p:sld xmlns:a="http://schemas.openxmlformats.org/drawingml/2006/main" xmlns:r="http://schemas.openxmlformats.org/officeDocument/2006/relationships" xmlns:p="http://schemas.openxmlformats.org/presentationml/2006/main">
-  <p:cSld>
-    <p:spTree>
-      <p:nvGrpSpPr>
-        <p:cNvPr id="1" name=""/>
-        <p:cNvGrpSpPr/>
-        <p:nvPr/>
-      </p:nvGrpSpPr>
-      <p:grpSpPr>
-        <a:xfrm>
-          <a:off x="0" y="0"/>
-          <a:ext cx="0" cy="0"/>
-          <a:chOff x="0" y="0"/>
-          <a:chExt cx="0" cy="0"/>
-        </a:xfrm>
-      </p:grpSpPr>
-      <p:sp>
-        <p:nvSpPr>
-          <p:cNvPr id="2" name="Title 1">
-            <a:extLst>
-              <a:ext uri="{FF2B5EF4-FFF2-40B4-BE49-F238E27FC236}">
-                <a16:creationId xmlns:a16="http://schemas.microsoft.com/office/drawing/2014/main" id="{DF8CD6F8-34B1-4A94-BF69-3F05F2321810}"/>
-              </a:ext>
-            </a:extLst>
-          </p:cNvPr>
-          <p:cNvSpPr>
-            <a:spLocks noGrp="1"/>
-          </p:cNvSpPr>
-          <p:nvPr>
-            <p:ph type="title"/>
-          </p:nvPr>
-        </p:nvSpPr>
-        <p:spPr/>
-        <p:txBody>
-          <a:bodyPr/>
-          <a:lstStyle/>
-          <a:p>
-            <a:pPr algn="ctr"/>
-            <a:r>
-              <a:rPr lang="en-GB" b="1" u="sng" dirty="0"/>
-              <a:t>Current Progress and Future Work</a:t>
-            </a:r>
-          </a:p>
-        </p:txBody>
-      </p:sp>
-      <p:sp>
-        <p:nvSpPr>
-          <p:cNvPr id="3" name="Content Placeholder 2">
-            <a:extLst>
-              <a:ext uri="{FF2B5EF4-FFF2-40B4-BE49-F238E27FC236}">
-                <a16:creationId xmlns:a16="http://schemas.microsoft.com/office/drawing/2014/main" id="{29A41982-12BE-45EF-B269-10C22B2E5B1C}"/>
-              </a:ext>
-            </a:extLst>
-          </p:cNvPr>
-          <p:cNvSpPr>
-            <a:spLocks noGrp="1"/>
-          </p:cNvSpPr>
-          <p:nvPr>
-            <p:ph idx="1"/>
-          </p:nvPr>
-        </p:nvSpPr>
-        <p:spPr/>
-        <p:txBody>
-          <a:bodyPr>
-            <a:normAutofit fontScale="92500"/>
-          </a:bodyPr>
-          <a:lstStyle/>
-          <a:p>
-            <a:r>
-              <a:rPr lang="en-GB" dirty="0"/>
-              <a:t>Planning systems currently work for a single robot and sequential actions.</a:t>
-            </a:r>
-          </a:p>
-          <a:p>
-            <a:r>
-              <a:rPr lang="en-GB" dirty="0"/>
-              <a:t>Old implementations need to be re-added:</a:t>
-            </a:r>
-          </a:p>
-          <a:p>
-            <a:pPr lvl="1"/>
-            <a:r>
-              <a:rPr lang="en-GB" dirty="0"/>
-              <a:t>Concurrency and multiple robots,</a:t>
-            </a:r>
-          </a:p>
-          <a:p>
-            <a:pPr lvl="1"/>
-            <a:r>
-              <a:rPr lang="en-GB" dirty="0"/>
-              <a:t>Discontinuous and Tasking models,</a:t>
-            </a:r>
-          </a:p>
-          <a:p>
-            <a:pPr lvl="1"/>
-            <a:r>
-              <a:rPr lang="en-GB" dirty="0"/>
-              <a:t>The diagnostics system.</a:t>
-            </a:r>
-          </a:p>
-          <a:p>
-            <a:r>
-              <a:rPr lang="en-GB" dirty="0"/>
-              <a:t>Work yet to do:</a:t>
-            </a:r>
-          </a:p>
-          <a:p>
-            <a:pPr lvl="1"/>
-            <a:r>
-              <a:rPr lang="en-GB" dirty="0"/>
-              <a:t>Various optimisations,</a:t>
-            </a:r>
-          </a:p>
-          <a:p>
-            <a:pPr lvl="1"/>
-            <a:r>
-              <a:rPr lang="en-GB" dirty="0"/>
-              <a:t>Plan repair algorithms,</a:t>
-            </a:r>
-          </a:p>
-          <a:p>
-            <a:pPr lvl="1"/>
-            <a:r>
-              <a:rPr lang="en-GB" dirty="0"/>
-              <a:t>Disassembly sequence planning case study.</a:t>
-            </a:r>
-          </a:p>
-          <a:p>
-            <a:r>
-              <a:rPr lang="en-GB" dirty="0"/>
-              <a:t>Hoping to test more domains to see how well the approach generalises.</a:t>
-            </a:r>
-          </a:p>
-        </p:txBody>
-      </p:sp>
-    </p:spTree>
-    <p:extLst>
-      <p:ext uri="{BB962C8B-B14F-4D97-AF65-F5344CB8AC3E}">
-        <p14:creationId xmlns:p14="http://schemas.microsoft.com/office/powerpoint/2010/main" val="338344156"/>
-      </p:ext>
-    </p:extLst>
-  </p:cSld>
-  <p:clrMapOvr>
-    <a:masterClrMapping/>
-  </p:clrMapOvr>
-</p:sld>
-</file>
-
-<file path=ppt/slides/slide14.xml><?xml version="1.0" encoding="utf-8"?>
-<p:sld xmlns:a="http://schemas.openxmlformats.org/drawingml/2006/main" xmlns:r="http://schemas.openxmlformats.org/officeDocument/2006/relationships" xmlns:p="http://schemas.openxmlformats.org/presentationml/2006/main" show="0">
   <p:cSld>
     <p:spTree>
       <p:nvGrpSpPr>
@@ -9165,8 +9407,8 @@
 </p:sld>
 </file>
 
-<file path=ppt/slides/slide15.xml><?xml version="1.0" encoding="utf-8"?>
-<p:sld xmlns:a="http://schemas.openxmlformats.org/drawingml/2006/main" xmlns:r="http://schemas.openxmlformats.org/officeDocument/2006/relationships" xmlns:p="http://schemas.openxmlformats.org/presentationml/2006/main" show="0">
+<file path=ppt/slides/slide17.xml><?xml version="1.0" encoding="utf-8"?>
+<p:sld xmlns:a="http://schemas.openxmlformats.org/drawingml/2006/main" xmlns:r="http://schemas.openxmlformats.org/officeDocument/2006/relationships" xmlns:p="http://schemas.openxmlformats.org/presentationml/2006/main">
   <p:cSld>
     <p:spTree>
       <p:nvGrpSpPr>
@@ -9682,8 +9924,8 @@
 </p:sld>
 </file>
 
-<file path=ppt/slides/slide16.xml><?xml version="1.0" encoding="utf-8"?>
-<p:sld xmlns:a="http://schemas.openxmlformats.org/drawingml/2006/main" xmlns:r="http://schemas.openxmlformats.org/officeDocument/2006/relationships" xmlns:p="http://schemas.openxmlformats.org/presentationml/2006/main" show="0">
+<file path=ppt/slides/slide18.xml><?xml version="1.0" encoding="utf-8"?>
+<p:sld xmlns:a="http://schemas.openxmlformats.org/drawingml/2006/main" xmlns:r="http://schemas.openxmlformats.org/officeDocument/2006/relationships" xmlns:p="http://schemas.openxmlformats.org/presentationml/2006/main">
   <p:cSld>
     <p:spTree>
       <p:nvGrpSpPr>
@@ -9756,7 +9998,7 @@
           <a:p>
             <a:r>
               <a:rPr lang="en-GB" dirty="0"/>
-              <a:t>The decision made in the abstract version of the planning problem must be maintain in the refinement to achieve conformance.</a:t>
+              <a:t>The decision made in the abstract version of the planning problem must be maintained in the refinement to achieve conformance.</a:t>
             </a:r>
           </a:p>
           <a:p>
@@ -10363,8 +10605,8 @@
 </p:sld>
 </file>
 
-<file path=ppt/slides/slide17.xml><?xml version="1.0" encoding="utf-8"?>
-<p:sld xmlns:a="http://schemas.openxmlformats.org/drawingml/2006/main" xmlns:r="http://schemas.openxmlformats.org/officeDocument/2006/relationships" xmlns:p="http://schemas.openxmlformats.org/presentationml/2006/main" show="0">
+<file path=ppt/slides/slide19.xml><?xml version="1.0" encoding="utf-8"?>
+<p:sld xmlns:a="http://schemas.openxmlformats.org/drawingml/2006/main" xmlns:r="http://schemas.openxmlformats.org/officeDocument/2006/relationships" xmlns:p="http://schemas.openxmlformats.org/presentationml/2006/main">
   <p:cSld>
     <p:spTree>
       <p:nvGrpSpPr>
@@ -10437,7 +10679,7 @@
           <a:p>
             <a:r>
               <a:rPr lang="en-GB" dirty="0"/>
-              <a:t>The robot does not consider that it will need to grasp the handle as the immediately next subgoal.</a:t>
+              <a:t>If we refine the sub-goals separately, we get this plan, where the robot does not consider that it will need to grasp the handle as the immediately next subgoal and instantly extends its arm.</a:t>
             </a:r>
           </a:p>
           <a:p>
@@ -11042,247 +11284,6 @@
 </p:sld>
 </file>
 
-<file path=ppt/slides/slide18.xml><?xml version="1.0" encoding="utf-8"?>
-<p:sld xmlns:a="http://schemas.openxmlformats.org/drawingml/2006/main" xmlns:r="http://schemas.openxmlformats.org/officeDocument/2006/relationships" xmlns:p="http://schemas.openxmlformats.org/presentationml/2006/main" show="0">
-  <p:cSld>
-    <p:spTree>
-      <p:nvGrpSpPr>
-        <p:cNvPr id="1" name=""/>
-        <p:cNvGrpSpPr/>
-        <p:nvPr/>
-      </p:nvGrpSpPr>
-      <p:grpSpPr>
-        <a:xfrm>
-          <a:off x="0" y="0"/>
-          <a:ext cx="0" cy="0"/>
-          <a:chOff x="0" y="0"/>
-          <a:chExt cx="0" cy="0"/>
-        </a:xfrm>
-      </p:grpSpPr>
-      <p:sp>
-        <p:nvSpPr>
-          <p:cNvPr id="2" name="Title 1">
-            <a:extLst>
-              <a:ext uri="{FF2B5EF4-FFF2-40B4-BE49-F238E27FC236}">
-                <a16:creationId xmlns:a16="http://schemas.microsoft.com/office/drawing/2014/main" id="{16327F63-4BA7-49F9-A5FB-363A3D6C6113}"/>
-              </a:ext>
-            </a:extLst>
-          </p:cNvPr>
-          <p:cNvSpPr>
-            <a:spLocks noGrp="1"/>
-          </p:cNvSpPr>
-          <p:nvPr>
-            <p:ph type="title"/>
-          </p:nvPr>
-        </p:nvSpPr>
-        <p:spPr/>
-        <p:txBody>
-          <a:bodyPr/>
-          <a:lstStyle/>
-          <a:p>
-            <a:r>
-              <a:rPr lang="en-GB" dirty="0"/>
-              <a:t>Hierarchical Plan Repair</a:t>
-            </a:r>
-          </a:p>
-        </p:txBody>
-      </p:sp>
-      <p:sp>
-        <p:nvSpPr>
-          <p:cNvPr id="3" name="Content Placeholder 2">
-            <a:extLst>
-              <a:ext uri="{FF2B5EF4-FFF2-40B4-BE49-F238E27FC236}">
-                <a16:creationId xmlns:a16="http://schemas.microsoft.com/office/drawing/2014/main" id="{DB55EE6F-ED43-4386-B01C-26CEA275602D}"/>
-              </a:ext>
-            </a:extLst>
-          </p:cNvPr>
-          <p:cNvSpPr>
-            <a:spLocks noGrp="1"/>
-          </p:cNvSpPr>
-          <p:nvPr>
-            <p:ph idx="1"/>
-          </p:nvPr>
-        </p:nvSpPr>
-        <p:spPr/>
-        <p:txBody>
-          <a:bodyPr/>
-          <a:lstStyle/>
-          <a:p>
-            <a:r>
-              <a:rPr lang="en-GB" dirty="0"/>
-              <a:t>Dealing with plan failure.</a:t>
-            </a:r>
-          </a:p>
-          <a:p>
-            <a:r>
-              <a:rPr lang="en-GB" dirty="0"/>
-              <a:t>Efficient diagnostics and identification of the failed partial plan(s):</a:t>
-            </a:r>
-          </a:p>
-          <a:p>
-            <a:pPr lvl="1"/>
-            <a:r>
-              <a:rPr lang="en-GB" dirty="0"/>
-              <a:t>Hierarchical nature of plans (formed by sequences of partial plans) means that only the parts of plans that have failed need to be regenerated, this is called plan repair,</a:t>
-            </a:r>
-          </a:p>
-          <a:p>
-            <a:pPr lvl="1"/>
-            <a:r>
-              <a:rPr lang="en-GB" dirty="0"/>
-              <a:t>Repaired plans tend to get progressively worse over time,</a:t>
-            </a:r>
-          </a:p>
-          <a:p>
-            <a:pPr lvl="1"/>
-            <a:r>
-              <a:rPr lang="en-GB" dirty="0"/>
-              <a:t>Doesn’t need any additional knowledge to support this.</a:t>
-            </a:r>
-          </a:p>
-          <a:p>
-            <a:r>
-              <a:rPr lang="en-GB" dirty="0"/>
-              <a:t>May also be possible to determine if a goal can not longer be achieved and reject it, this kind of “goal reasoning” is usually difficult to support.</a:t>
-            </a:r>
-          </a:p>
-        </p:txBody>
-      </p:sp>
-    </p:spTree>
-    <p:extLst>
-      <p:ext uri="{BB962C8B-B14F-4D97-AF65-F5344CB8AC3E}">
-        <p14:creationId xmlns:p14="http://schemas.microsoft.com/office/powerpoint/2010/main" val="2855345987"/>
-      </p:ext>
-    </p:extLst>
-  </p:cSld>
-  <p:clrMapOvr>
-    <a:masterClrMapping/>
-  </p:clrMapOvr>
-</p:sld>
-</file>
-
-<file path=ppt/slides/slide19.xml><?xml version="1.0" encoding="utf-8"?>
-<p:sld xmlns:a="http://schemas.openxmlformats.org/drawingml/2006/main" xmlns:r="http://schemas.openxmlformats.org/officeDocument/2006/relationships" xmlns:p="http://schemas.openxmlformats.org/presentationml/2006/main" show="0">
-  <p:cSld>
-    <p:spTree>
-      <p:nvGrpSpPr>
-        <p:cNvPr id="1" name=""/>
-        <p:cNvGrpSpPr/>
-        <p:nvPr/>
-      </p:nvGrpSpPr>
-      <p:grpSpPr>
-        <a:xfrm>
-          <a:off x="0" y="0"/>
-          <a:ext cx="0" cy="0"/>
-          <a:chOff x="0" y="0"/>
-          <a:chExt cx="0" cy="0"/>
-        </a:xfrm>
-      </p:grpSpPr>
-      <p:sp>
-        <p:nvSpPr>
-          <p:cNvPr id="2" name="Title 1">
-            <a:extLst>
-              <a:ext uri="{FF2B5EF4-FFF2-40B4-BE49-F238E27FC236}">
-                <a16:creationId xmlns:a16="http://schemas.microsoft.com/office/drawing/2014/main" id="{3F7E0D63-475A-42CE-BB3D-CE7BD92FCEB4}"/>
-              </a:ext>
-            </a:extLst>
-          </p:cNvPr>
-          <p:cNvSpPr>
-            <a:spLocks noGrp="1"/>
-          </p:cNvSpPr>
-          <p:nvPr>
-            <p:ph type="title"/>
-          </p:nvPr>
-        </p:nvSpPr>
-        <p:spPr/>
-        <p:txBody>
-          <a:bodyPr/>
-          <a:lstStyle/>
-          <a:p>
-            <a:r>
-              <a:rPr lang="en-GB" dirty="0"/>
-              <a:t>Examples</a:t>
-            </a:r>
-          </a:p>
-        </p:txBody>
-      </p:sp>
-      <p:sp>
-        <p:nvSpPr>
-          <p:cNvPr id="3" name="Content Placeholder 2">
-            <a:extLst>
-              <a:ext uri="{FF2B5EF4-FFF2-40B4-BE49-F238E27FC236}">
-                <a16:creationId xmlns:a16="http://schemas.microsoft.com/office/drawing/2014/main" id="{237420B3-2350-48C6-B7BE-D7F817F170E9}"/>
-              </a:ext>
-            </a:extLst>
-          </p:cNvPr>
-          <p:cNvSpPr>
-            <a:spLocks noGrp="1"/>
-          </p:cNvSpPr>
-          <p:nvPr>
-            <p:ph idx="1"/>
-          </p:nvPr>
-        </p:nvSpPr>
-        <p:spPr/>
-        <p:txBody>
-          <a:bodyPr>
-            <a:normAutofit/>
-          </a:bodyPr>
-          <a:lstStyle/>
-          <a:p>
-            <a:r>
-              <a:rPr lang="en-GB" dirty="0"/>
-              <a:t>A milk-man problem,</a:t>
-            </a:r>
-          </a:p>
-          <a:p>
-            <a:pPr lvl="1"/>
-            <a:r>
-              <a:rPr lang="en-GB" dirty="0"/>
-              <a:t>Decide on the order to visit the houses based on a simple Euclidean distance, a “relaxed” version of the problem, last place to visit should make it easy to get home.</a:t>
-            </a:r>
-          </a:p>
-          <a:p>
-            <a:pPr lvl="1"/>
-            <a:r>
-              <a:rPr lang="en-GB" dirty="0"/>
-              <a:t>Over time, the milk man gets used to the route and makes better choices.</a:t>
-            </a:r>
-          </a:p>
-          <a:p>
-            <a:r>
-              <a:rPr lang="en-GB" dirty="0"/>
-              <a:t>A cooking problem,</a:t>
-            </a:r>
-          </a:p>
-          <a:p>
-            <a:pPr lvl="1"/>
-            <a:r>
-              <a:rPr lang="en-GB" dirty="0"/>
-              <a:t>You find, or decide for yourself, some instructions, are relatively vague and general description of the sub-tasks to be completed, and the ingredients needed to complete them.</a:t>
-            </a:r>
-          </a:p>
-          <a:p>
-            <a:pPr lvl="1"/>
-            <a:r>
-              <a:rPr lang="en-GB" dirty="0"/>
-              <a:t>You consider the complexities later, e.g. how to crack the eggs, what pan to use, what hob to use.</a:t>
-            </a:r>
-          </a:p>
-        </p:txBody>
-      </p:sp>
-    </p:spTree>
-    <p:extLst>
-      <p:ext uri="{BB962C8B-B14F-4D97-AF65-F5344CB8AC3E}">
-        <p14:creationId xmlns:p14="http://schemas.microsoft.com/office/powerpoint/2010/main" val="3477798111"/>
-      </p:ext>
-    </p:extLst>
-  </p:cSld>
-  <p:clrMapOvr>
-    <a:masterClrMapping/>
-  </p:clrMapOvr>
-</p:sld>
-</file>
-
 <file path=ppt/slides/slide2.xml><?xml version="1.0" encoding="utf-8"?>
 <p:sld xmlns:a="http://schemas.openxmlformats.org/drawingml/2006/main" xmlns:r="http://schemas.openxmlformats.org/officeDocument/2006/relationships" xmlns:p="http://schemas.openxmlformats.org/presentationml/2006/main">
   <p:cSld>
@@ -11430,7 +11431,7 @@
 </file>
 
 <file path=ppt/slides/slide20.xml><?xml version="1.0" encoding="utf-8"?>
-<p:sld xmlns:a="http://schemas.openxmlformats.org/drawingml/2006/main" xmlns:r="http://schemas.openxmlformats.org/officeDocument/2006/relationships" xmlns:p="http://schemas.openxmlformats.org/presentationml/2006/main" show="0">
+<p:sld xmlns:a="http://schemas.openxmlformats.org/drawingml/2006/main" xmlns:r="http://schemas.openxmlformats.org/officeDocument/2006/relationships" xmlns:p="http://schemas.openxmlformats.org/presentationml/2006/main">
   <p:cSld>
     <p:spTree>
       <p:nvGrpSpPr>
@@ -11451,7 +11452,7 @@
           <p:cNvPr id="2" name="Title 1">
             <a:extLst>
               <a:ext uri="{FF2B5EF4-FFF2-40B4-BE49-F238E27FC236}">
-                <a16:creationId xmlns:a16="http://schemas.microsoft.com/office/drawing/2014/main" id="{C85E89E5-8E92-48CD-B25B-D43EF6966868}"/>
+                <a16:creationId xmlns:a16="http://schemas.microsoft.com/office/drawing/2014/main" id="{DF8CD6F8-34B1-4A94-BF69-3F05F2321810}"/>
               </a:ext>
             </a:extLst>
           </p:cNvPr>
@@ -11467,9 +11468,10 @@
           <a:bodyPr/>
           <a:lstStyle/>
           <a:p>
-            <a:r>
-              <a:rPr lang="en-GB" dirty="0"/>
-              <a:t>Different Abstract Models</a:t>
+            <a:pPr algn="ctr"/>
+            <a:r>
+              <a:rPr lang="en-GB" b="1" u="sng" dirty="0"/>
+              <a:t>Current Progress and Future Work</a:t>
             </a:r>
           </a:p>
         </p:txBody>
@@ -11479,7 +11481,7 @@
           <p:cNvPr id="3" name="Content Placeholder 2">
             <a:extLst>
               <a:ext uri="{FF2B5EF4-FFF2-40B4-BE49-F238E27FC236}">
-                <a16:creationId xmlns:a16="http://schemas.microsoft.com/office/drawing/2014/main" id="{347F735C-6326-486A-808C-AFF81DEF1B00}"/>
+                <a16:creationId xmlns:a16="http://schemas.microsoft.com/office/drawing/2014/main" id="{29A41982-12BE-45EF-B269-10C22B2E5B1C}"/>
               </a:ext>
             </a:extLst>
           </p:cNvPr>
@@ -11493,31 +11495,73 @@
         <p:spPr/>
         <p:txBody>
           <a:bodyPr>
-            <a:normAutofit lnSpcReduction="10000"/>
+            <a:normAutofit fontScale="92500"/>
           </a:bodyPr>
           <a:lstStyle/>
           <a:p>
             <a:r>
               <a:rPr lang="en-GB" dirty="0"/>
-              <a:t>Relaxed Models: Remove planning constraints, e.g. preconditions of actions, to shorten plans and reduce search spaces.</a:t>
-            </a:r>
-          </a:p>
-          <a:p>
-            <a:r>
-              <a:rPr lang="en-GB" dirty="0"/>
-              <a:t>Condensed Models: Remove the detailed parts/pieces of entities, combine them into abstract descriptors, reducing state space and plan length.</a:t>
-            </a:r>
-          </a:p>
-          <a:p>
-            <a:r>
-              <a:rPr lang="en-GB" dirty="0"/>
-              <a:t>Discontinuous Models: Ignore inertia, e.g. a robot is simultaneously in every location it has previously been, if we can get there once, we can get there again, reduces plan lengths.</a:t>
-            </a:r>
-          </a:p>
-          <a:p>
-            <a:r>
-              <a:rPr lang="en-GB" dirty="0"/>
-              <a:t>Tasking Model: Split the planning problem into a sequence of very high level tasks, allows more extensive problem division, but much more bespoke to each application domain.</a:t>
+              <a:t>Planning systems currently work for a single robot and sequential actions.</a:t>
+            </a:r>
+          </a:p>
+          <a:p>
+            <a:r>
+              <a:rPr lang="en-GB" dirty="0"/>
+              <a:t>Old implementations need to be re-added:</a:t>
+            </a:r>
+          </a:p>
+          <a:p>
+            <a:pPr lvl="1"/>
+            <a:r>
+              <a:rPr lang="en-GB" dirty="0"/>
+              <a:t>Concurrency and multiple robots,</a:t>
+            </a:r>
+          </a:p>
+          <a:p>
+            <a:pPr lvl="1"/>
+            <a:r>
+              <a:rPr lang="en-GB" dirty="0"/>
+              <a:t>Discontinuous and Tasking models,</a:t>
+            </a:r>
+          </a:p>
+          <a:p>
+            <a:pPr lvl="1"/>
+            <a:r>
+              <a:rPr lang="en-GB" dirty="0"/>
+              <a:t>The diagnostics system.</a:t>
+            </a:r>
+          </a:p>
+          <a:p>
+            <a:r>
+              <a:rPr lang="en-GB" dirty="0"/>
+              <a:t>Work yet to do:</a:t>
+            </a:r>
+          </a:p>
+          <a:p>
+            <a:pPr lvl="1"/>
+            <a:r>
+              <a:rPr lang="en-GB" dirty="0"/>
+              <a:t>Various optimisations,</a:t>
+            </a:r>
+          </a:p>
+          <a:p>
+            <a:pPr lvl="1"/>
+            <a:r>
+              <a:rPr lang="en-GB" dirty="0"/>
+              <a:t>Plan repair algorithms,</a:t>
+            </a:r>
+          </a:p>
+          <a:p>
+            <a:pPr lvl="1"/>
+            <a:r>
+              <a:rPr lang="en-GB" dirty="0"/>
+              <a:t>Disassembly sequence planning case study.</a:t>
+            </a:r>
+          </a:p>
+          <a:p>
+            <a:r>
+              <a:rPr lang="en-GB" dirty="0"/>
+              <a:t>Hoping to test more domains to see how well the approach generalises.</a:t>
             </a:r>
           </a:p>
         </p:txBody>
@@ -11525,7 +11569,7 @@
     </p:spTree>
     <p:extLst>
       <p:ext uri="{BB962C8B-B14F-4D97-AF65-F5344CB8AC3E}">
-        <p14:creationId xmlns:p14="http://schemas.microsoft.com/office/powerpoint/2010/main" val="1003886819"/>
+        <p14:creationId xmlns:p14="http://schemas.microsoft.com/office/powerpoint/2010/main" val="338344156"/>
       </p:ext>
     </p:extLst>
   </p:cSld>
@@ -12304,7 +12348,7 @@
           <p:cNvPr id="2" name="Title 1">
             <a:extLst>
               <a:ext uri="{FF2B5EF4-FFF2-40B4-BE49-F238E27FC236}">
-                <a16:creationId xmlns:a16="http://schemas.microsoft.com/office/drawing/2014/main" id="{FFB68893-CB82-4163-86E9-F0D5632754BE}"/>
+                <a16:creationId xmlns:a16="http://schemas.microsoft.com/office/drawing/2014/main" id="{3F7E0D63-475A-42CE-BB3D-CE7BD92FCEB4}"/>
               </a:ext>
             </a:extLst>
           </p:cNvPr>
@@ -12323,7 +12367,7 @@
             <a:pPr algn="ctr"/>
             <a:r>
               <a:rPr lang="en-GB" b="1" u="sng" dirty="0"/>
-              <a:t>Refinement Planning</a:t>
+              <a:t>Examples of Refinement Planning by Humans</a:t>
             </a:r>
           </a:p>
         </p:txBody>
@@ -12333,7 +12377,7 @@
           <p:cNvPr id="3" name="Content Placeholder 2">
             <a:extLst>
               <a:ext uri="{FF2B5EF4-FFF2-40B4-BE49-F238E27FC236}">
-                <a16:creationId xmlns:a16="http://schemas.microsoft.com/office/drawing/2014/main" id="{2B7C501E-9234-42D2-8D93-80E4FD4DC290}"/>
+                <a16:creationId xmlns:a16="http://schemas.microsoft.com/office/drawing/2014/main" id="{237420B3-2350-48C6-B7BE-D7F817F170E9}"/>
               </a:ext>
             </a:extLst>
           </p:cNvPr>
@@ -12347,91 +12391,47 @@
         <p:spPr/>
         <p:txBody>
           <a:bodyPr>
-            <a:normAutofit fontScale="92500" lnSpcReduction="10000"/>
+            <a:normAutofit/>
           </a:bodyPr>
           <a:lstStyle/>
           <a:p>
             <a:r>
-              <a:rPr lang="en-GB" dirty="0"/>
-              <a:t>Doesn’t need prescriptive knowledge for search or to divide problem:</a:t>
+              <a:rPr lang="en-GB" b="1" dirty="0"/>
+              <a:t>A milk-man problem:</a:t>
             </a:r>
           </a:p>
           <a:p>
             <a:pPr lvl="1"/>
             <a:r>
               <a:rPr lang="en-GB" dirty="0"/>
-              <a:t>Generally very easy to define the abstraction hierarchy,</a:t>
+              <a:t>Decide on the order to visit the houses based on a simple Euclidean distance, a “relaxed” version of the problem, last place to visit should make it easy to get home.</a:t>
             </a:r>
           </a:p>
           <a:p>
             <a:pPr lvl="1"/>
             <a:r>
               <a:rPr lang="en-GB" dirty="0"/>
-              <a:t>Still possible to use (partial) heuristic in refinement planning if available.</a:t>
-            </a:r>
-          </a:p>
-          <a:p>
-            <a:pPr marL="0" indent="0">
-              <a:buNone/>
-            </a:pPr>
-            <a:endParaRPr lang="en-GB" sz="900" dirty="0"/>
-          </a:p>
-          <a:p>
-            <a:r>
-              <a:rPr lang="en-GB" dirty="0"/>
-              <a:t>But generated plans can be arbitrarily worse:</a:t>
+              <a:t>Over time, the milk man gets used to the route and makes better choices.</a:t>
+            </a:r>
+          </a:p>
+          <a:p>
+            <a:r>
+              <a:rPr lang="en-GB" b="1" dirty="0"/>
+              <a:t>A cooking problem:</a:t>
             </a:r>
           </a:p>
           <a:p>
             <a:pPr lvl="1"/>
             <a:r>
-              <a:rPr lang="en-GB" b="1" dirty="0"/>
-              <a:t>Ignorance problem</a:t>
-            </a:r>
-            <a:r>
-              <a:rPr lang="en-GB" dirty="0"/>
-              <a:t>: Occurring from the lost knowledge in the abstractions.</a:t>
+              <a:rPr lang="en-GB" dirty="0"/>
+              <a:t>You find, or decide for yourself, some instructions, are relatively vague and general description of the sub-tasks to be completed, and the ingredients needed to complete them.</a:t>
             </a:r>
           </a:p>
           <a:p>
             <a:pPr lvl="1"/>
             <a:r>
-              <a:rPr lang="en-GB" b="1" dirty="0"/>
-              <a:t>Dependency problem</a:t>
-            </a:r>
-            <a:r>
-              <a:rPr lang="en-GB" dirty="0"/>
-              <a:t>: Occurring from the division of problems into subproblems that are assumed independent, this assumption almost always fails.</a:t>
-            </a:r>
-          </a:p>
-          <a:p>
-            <a:pPr lvl="1"/>
-            <a:r>
-              <a:rPr lang="en-GB" b="1" dirty="0"/>
-              <a:t>Inflexible technique </a:t>
-            </a:r>
-            <a:r>
-              <a:rPr lang="en-GB" dirty="0"/>
-              <a:t>makes this worse, each abstract action refined separately.</a:t>
-            </a:r>
-          </a:p>
-          <a:p>
-            <a:pPr marL="0" indent="0">
-              <a:buNone/>
-            </a:pPr>
-            <a:endParaRPr lang="en-GB" sz="900" dirty="0"/>
-          </a:p>
-          <a:p>
-            <a:r>
-              <a:rPr lang="en-GB" dirty="0"/>
-              <a:t>Not very expressive in terms of defining abstractions:</a:t>
-            </a:r>
-          </a:p>
-          <a:p>
-            <a:pPr lvl="1"/>
-            <a:r>
-              <a:rPr lang="en-GB" dirty="0"/>
-              <a:t>Allows only “relaxing” the classical problem, a removal of action preconditions.</a:t>
+              <a:rPr lang="en-GB" dirty="0"/>
+              <a:t>You consider the complexities later, e.g. how to crack the eggs, what pan to use, what hob to use.</a:t>
             </a:r>
           </a:p>
         </p:txBody>
@@ -12439,7 +12439,7 @@
     </p:spTree>
     <p:extLst>
       <p:ext uri="{BB962C8B-B14F-4D97-AF65-F5344CB8AC3E}">
-        <p14:creationId xmlns:p14="http://schemas.microsoft.com/office/powerpoint/2010/main" val="4274190545"/>
+        <p14:creationId xmlns:p14="http://schemas.microsoft.com/office/powerpoint/2010/main" val="3477798111"/>
       </p:ext>
     </p:extLst>
   </p:cSld>
@@ -12471,7 +12471,7 @@
           <p:cNvPr id="2" name="Title 1">
             <a:extLst>
               <a:ext uri="{FF2B5EF4-FFF2-40B4-BE49-F238E27FC236}">
-                <a16:creationId xmlns:a16="http://schemas.microsoft.com/office/drawing/2014/main" id="{A03BDA8B-A878-4DFF-9398-03FAA58C328A}"/>
+                <a16:creationId xmlns:a16="http://schemas.microsoft.com/office/drawing/2014/main" id="{FFB68893-CB82-4163-86E9-F0D5632754BE}"/>
               </a:ext>
             </a:extLst>
           </p:cNvPr>
@@ -12490,7 +12490,7 @@
             <a:pPr algn="ctr"/>
             <a:r>
               <a:rPr lang="en-GB" b="1" u="sng" dirty="0"/>
-              <a:t>Answer Set Programming (ASP) based Planning</a:t>
+              <a:t>Benefits and Problems of Refinement Planning</a:t>
             </a:r>
           </a:p>
         </p:txBody>
@@ -12500,7 +12500,7 @@
           <p:cNvPr id="3" name="Content Placeholder 2">
             <a:extLst>
               <a:ext uri="{FF2B5EF4-FFF2-40B4-BE49-F238E27FC236}">
-                <a16:creationId xmlns:a16="http://schemas.microsoft.com/office/drawing/2014/main" id="{3A3F716E-C7D2-4144-ABA1-5AAD8705521B}"/>
+                <a16:creationId xmlns:a16="http://schemas.microsoft.com/office/drawing/2014/main" id="{2B7C501E-9234-42D2-8D93-80E4FD4DC290}"/>
               </a:ext>
             </a:extLst>
           </p:cNvPr>
@@ -12514,75 +12514,91 @@
         <p:spPr/>
         <p:txBody>
           <a:bodyPr>
-            <a:normAutofit/>
+            <a:normAutofit fontScale="92500" lnSpcReduction="10000"/>
           </a:bodyPr>
           <a:lstStyle/>
           <a:p>
             <a:r>
               <a:rPr lang="en-GB" dirty="0"/>
-              <a:t>Knowledge Representation and Reasoning language:</a:t>
+              <a:t>Doesn’t need prescriptive knowledge for search or to divide problem:</a:t>
             </a:r>
           </a:p>
           <a:p>
             <a:pPr lvl="1"/>
             <a:r>
               <a:rPr lang="en-GB" dirty="0"/>
-              <a:t>Extremely expressive in terms of modelled descriptive knowledge,</a:t>
+              <a:t>Generally very easy to define the abstraction hierarchy,</a:t>
             </a:r>
           </a:p>
           <a:p>
             <a:pPr lvl="1"/>
             <a:r>
               <a:rPr lang="en-GB" dirty="0"/>
-              <a:t>Can deal with very large number of facts and (recursive) relations,</a:t>
+              <a:t>Still possible to use (partial) heuristic in refinement planning if available.</a:t>
+            </a:r>
+          </a:p>
+          <a:p>
+            <a:pPr marL="0" indent="0">
+              <a:buNone/>
+            </a:pPr>
+            <a:endParaRPr lang="en-GB" sz="900" dirty="0"/>
+          </a:p>
+          <a:p>
+            <a:r>
+              <a:rPr lang="en-GB" dirty="0"/>
+              <a:t>But generated plans can be arbitrarily worse:</a:t>
             </a:r>
           </a:p>
           <a:p>
             <a:pPr lvl="1"/>
             <a:r>
-              <a:rPr lang="en-GB" dirty="0"/>
-              <a:t>Can directly combine planning and diagnostics,</a:t>
+              <a:rPr lang="en-GB" b="1" dirty="0"/>
+              <a:t>Ignorance problem</a:t>
+            </a:r>
+            <a:r>
+              <a:rPr lang="en-GB" dirty="0"/>
+              <a:t>: Occurring from the lost knowledge in the abstractions.</a:t>
             </a:r>
           </a:p>
           <a:p>
             <a:pPr lvl="1"/>
             <a:r>
-              <a:rPr lang="en-GB" dirty="0"/>
-              <a:t>Excellent for representing abstraction hierarchies.</a:t>
-            </a:r>
-            <a:endParaRPr lang="en-GB" sz="2800" dirty="0"/>
+              <a:rPr lang="en-GB" b="1" dirty="0"/>
+              <a:t>Dependency problem</a:t>
+            </a:r>
+            <a:r>
+              <a:rPr lang="en-GB" dirty="0"/>
+              <a:t>: Occurring from the division of problems into subproblems that are assumed independent, this assumption almost always fails.</a:t>
+            </a:r>
+          </a:p>
+          <a:p>
+            <a:pPr lvl="1"/>
+            <a:r>
+              <a:rPr lang="en-GB" b="1" dirty="0"/>
+              <a:t>Inflexible technique </a:t>
+            </a:r>
+            <a:r>
+              <a:rPr lang="en-GB" dirty="0"/>
+              <a:t>makes this worse, each abstract action refined separately.</a:t>
+            </a:r>
           </a:p>
           <a:p>
             <a:pPr marL="0" indent="0">
               <a:buNone/>
             </a:pPr>
-            <a:endParaRPr lang="en-GB" sz="800" dirty="0"/>
-          </a:p>
-          <a:p>
-            <a:r>
-              <a:rPr lang="en-GB" dirty="0"/>
-              <a:t>Has been limited to classical planning:</a:t>
+            <a:endParaRPr lang="en-GB" sz="900" dirty="0"/>
+          </a:p>
+          <a:p>
+            <a:r>
+              <a:rPr lang="en-GB" dirty="0"/>
+              <a:t>Not very expressive in terms of defining abstractions:</a:t>
             </a:r>
           </a:p>
           <a:p>
             <a:pPr lvl="1"/>
             <a:r>
               <a:rPr lang="en-GB" dirty="0"/>
-              <a:t>Planning is based on incremental search, similar to iterative deepening,</a:t>
-            </a:r>
-          </a:p>
-          <a:p>
-            <a:pPr lvl="1"/>
-            <a:r>
-              <a:rPr lang="en-GB" dirty="0"/>
-              <a:t>Becomes extremely poor when dealing with long plans,</a:t>
-            </a:r>
-          </a:p>
-          <a:p>
-            <a:pPr lvl="1"/>
-            <a:r>
-              <a:rPr lang="en-GB" dirty="0"/>
-              <a:t>Very difficult to represent prescriptive knowledge, heuristics non-applicable.</a:t>
+              <a:t>Allows only “relaxing” the classical problem, a removal of action preconditions.</a:t>
             </a:r>
           </a:p>
         </p:txBody>
@@ -12590,7 +12606,7 @@
     </p:spTree>
     <p:extLst>
       <p:ext uri="{BB962C8B-B14F-4D97-AF65-F5344CB8AC3E}">
-        <p14:creationId xmlns:p14="http://schemas.microsoft.com/office/powerpoint/2010/main" val="1195063207"/>
+        <p14:creationId xmlns:p14="http://schemas.microsoft.com/office/powerpoint/2010/main" val="4274190545"/>
       </p:ext>
     </p:extLst>
   </p:cSld>
@@ -12622,7 +12638,7 @@
           <p:cNvPr id="2" name="Title 1">
             <a:extLst>
               <a:ext uri="{FF2B5EF4-FFF2-40B4-BE49-F238E27FC236}">
-                <a16:creationId xmlns:a16="http://schemas.microsoft.com/office/drawing/2014/main" id="{CEF73766-C71F-4039-94C4-939D6325EE83}"/>
+                <a16:creationId xmlns:a16="http://schemas.microsoft.com/office/drawing/2014/main" id="{A03BDA8B-A878-4DFF-9398-03FAA58C328A}"/>
               </a:ext>
             </a:extLst>
           </p:cNvPr>
@@ -12641,7 +12657,7 @@
             <a:pPr algn="ctr"/>
             <a:r>
               <a:rPr lang="en-GB" b="1" u="sng" dirty="0"/>
-              <a:t>Conformance Refinement</a:t>
+              <a:t>Answer Set Programming (ASP) based Planning</a:t>
             </a:r>
           </a:p>
         </p:txBody>
@@ -12651,7 +12667,7 @@
           <p:cNvPr id="3" name="Content Placeholder 2">
             <a:extLst>
               <a:ext uri="{FF2B5EF4-FFF2-40B4-BE49-F238E27FC236}">
-                <a16:creationId xmlns:a16="http://schemas.microsoft.com/office/drawing/2014/main" id="{8379E798-EA76-44E2-A5D3-9C3D5E52B554}"/>
+                <a16:creationId xmlns:a16="http://schemas.microsoft.com/office/drawing/2014/main" id="{3A3F716E-C7D2-4144-ABA1-5AAD8705521B}"/>
               </a:ext>
             </a:extLst>
           </p:cNvPr>
@@ -12665,73 +12681,75 @@
         <p:spPr/>
         <p:txBody>
           <a:bodyPr>
-            <a:normAutofit fontScale="92500" lnSpcReduction="10000"/>
+            <a:normAutofit/>
           </a:bodyPr>
           <a:lstStyle/>
           <a:p>
-            <a:pPr marL="0" indent="0" algn="ctr">
+            <a:r>
+              <a:rPr lang="en-GB" dirty="0"/>
+              <a:t>Knowledge Representation and Reasoning language:</a:t>
+            </a:r>
+          </a:p>
+          <a:p>
+            <a:pPr lvl="1"/>
+            <a:r>
+              <a:rPr lang="en-GB" dirty="0"/>
+              <a:t>Extremely expressive in terms of modelled descriptive knowledge,</a:t>
+            </a:r>
+          </a:p>
+          <a:p>
+            <a:pPr lvl="1"/>
+            <a:r>
+              <a:rPr lang="en-GB" dirty="0"/>
+              <a:t>Can deal with very large number of facts and (recursive) relations,</a:t>
+            </a:r>
+          </a:p>
+          <a:p>
+            <a:pPr lvl="1"/>
+            <a:r>
+              <a:rPr lang="en-GB" dirty="0"/>
+              <a:t>Can directly combine planning and diagnostics,</a:t>
+            </a:r>
+          </a:p>
+          <a:p>
+            <a:pPr lvl="1"/>
+            <a:r>
+              <a:rPr lang="en-GB" dirty="0"/>
+              <a:t>Excellent for representing abstraction hierarchies.</a:t>
+            </a:r>
+            <a:endParaRPr lang="en-GB" sz="2800" dirty="0"/>
+          </a:p>
+          <a:p>
+            <a:pPr marL="0" indent="0">
               <a:buNone/>
             </a:pPr>
-            <a:r>
-              <a:rPr lang="en-GB" dirty="0"/>
-              <a:t>Conformance refinement requires that a plan generated over an abstraction hierarchy remains structurally similar and achieve same effects at all levels.</a:t>
-            </a:r>
-          </a:p>
-          <a:p>
-            <a:pPr marL="0" indent="0">
-              <a:buNone/>
-            </a:pPr>
-            <a:endParaRPr lang="en-GB" sz="900" dirty="0"/>
-          </a:p>
-          <a:p>
-            <a:r>
-              <a:rPr lang="en-GB" dirty="0"/>
-              <a:t>An attempt to make ASP based planners general, expressive and fast.</a:t>
-            </a:r>
-          </a:p>
-          <a:p>
-            <a:r>
-              <a:rPr lang="en-GB" dirty="0"/>
-              <a:t>Takes the human approach, only decide on the abstract stages of the plan initially, deals with the details later and as they emerge.</a:t>
-            </a:r>
-          </a:p>
-          <a:p>
-            <a:r>
-              <a:rPr lang="en-GB" dirty="0"/>
-              <a:t>Provides better integration of planning and diagnostics.</a:t>
-            </a:r>
-          </a:p>
-          <a:p>
-            <a:pPr marL="0" indent="0">
-              <a:buNone/>
-            </a:pPr>
-            <a:endParaRPr lang="en-GB" sz="900" dirty="0"/>
-          </a:p>
-          <a:p>
-            <a:r>
-              <a:rPr lang="en-GB" dirty="0"/>
-              <a:t>Refines based on the effects of planned actions passed as subgoals:</a:t>
+            <a:endParaRPr lang="en-GB" sz="800" dirty="0"/>
+          </a:p>
+          <a:p>
+            <a:r>
+              <a:rPr lang="en-GB" dirty="0"/>
+              <a:t>Has been limited to classical planning:</a:t>
             </a:r>
           </a:p>
           <a:p>
             <a:pPr lvl="1"/>
             <a:r>
               <a:rPr lang="en-GB" dirty="0"/>
-              <a:t>More expressive abstractions, any abstract model with a state space mapping,</a:t>
+              <a:t>Planning is based on incremental search, similar to iterative deepening,</a:t>
             </a:r>
           </a:p>
           <a:p>
             <a:pPr lvl="1"/>
             <a:r>
               <a:rPr lang="en-GB" dirty="0"/>
-              <a:t>Allows refinement of any number of actions at once,</a:t>
+              <a:t>Becomes extremely poor when dealing with long plans,</a:t>
             </a:r>
           </a:p>
           <a:p>
             <a:pPr lvl="1"/>
             <a:r>
               <a:rPr lang="en-GB" dirty="0"/>
-              <a:t>Allows flexible online plan generation and repair.</a:t>
+              <a:t>Very difficult to represent prescriptive knowledge, heuristics non-applicable.</a:t>
             </a:r>
           </a:p>
         </p:txBody>
@@ -12739,7 +12757,7 @@
     </p:spTree>
     <p:extLst>
       <p:ext uri="{BB962C8B-B14F-4D97-AF65-F5344CB8AC3E}">
-        <p14:creationId xmlns:p14="http://schemas.microsoft.com/office/powerpoint/2010/main" val="709079334"/>
+        <p14:creationId xmlns:p14="http://schemas.microsoft.com/office/powerpoint/2010/main" val="1195063207"/>
       </p:ext>
     </p:extLst>
   </p:cSld>

</xml_diff>